<commit_message>
updating presentation. also added a pdf version.
</commit_message>
<xml_diff>
--- a/project-management/Presentations/Chinese Checkers - Iteration #1.pptx
+++ b/project-management/Presentations/Chinese Checkers - Iteration #1.pptx
@@ -25,6 +25,10 @@
     <p:sldId id="270" r:id="rId20"/>
     <p:sldId id="271" r:id="rId21"/>
     <p:sldId id="272" r:id="rId22"/>
+    <p:sldId id="273" r:id="rId23"/>
+    <p:sldId id="274" r:id="rId24"/>
+    <p:sldId id="275" r:id="rId25"/>
+    <p:sldId id="276" r:id="rId26"/>
   </p:sldIdLst>
   <p:sldSz cy="5143500" cx="9144000"/>
   <p:notesSz cy="9144000" cx="6858000"/>
@@ -523,7 +527,7 @@
   <p:cSld>
     <p:spTree>
       <p:nvGrpSpPr>
-        <p:cNvPr id="79" name="Shape 79"/>
+        <p:cNvPr id="80" name="Shape 80"/>
         <p:cNvGrpSpPr/>
         <p:nvPr/>
       </p:nvGrpSpPr>
@@ -537,7 +541,7 @@
       </p:grpSpPr>
       <p:sp>
         <p:nvSpPr>
-          <p:cNvPr id="80" name="Shape 80"/>
+          <p:cNvPr id="81" name="Shape 81"/>
           <p:cNvSpPr/>
           <p:nvPr>
             <p:ph idx="2" type="sldImg"/>
@@ -571,7 +575,7 @@
       </p:sp>
       <p:sp>
         <p:nvSpPr>
-          <p:cNvPr id="81" name="Shape 81"/>
+          <p:cNvPr id="82" name="Shape 82"/>
           <p:cNvSpPr txBox="1"/>
           <p:nvPr>
             <p:ph idx="1" type="body"/>
@@ -607,7 +611,7 @@
   <p:cSld>
     <p:spTree>
       <p:nvGrpSpPr>
-        <p:cNvPr id="85" name="Shape 85"/>
+        <p:cNvPr id="90" name="Shape 90"/>
         <p:cNvGrpSpPr/>
         <p:nvPr/>
       </p:nvGrpSpPr>
@@ -621,7 +625,7 @@
       </p:grpSpPr>
       <p:sp>
         <p:nvSpPr>
-          <p:cNvPr id="86" name="Shape 86"/>
+          <p:cNvPr id="91" name="Shape 91"/>
           <p:cNvSpPr/>
           <p:nvPr>
             <p:ph idx="2" type="sldImg"/>
@@ -655,7 +659,7 @@
       </p:sp>
       <p:sp>
         <p:nvSpPr>
-          <p:cNvPr id="87" name="Shape 87"/>
+          <p:cNvPr id="92" name="Shape 92"/>
           <p:cNvSpPr txBox="1"/>
           <p:nvPr>
             <p:ph idx="1" type="body"/>
@@ -691,7 +695,7 @@
   <p:cSld>
     <p:spTree>
       <p:nvGrpSpPr>
-        <p:cNvPr id="95" name="Shape 95"/>
+        <p:cNvPr id="96" name="Shape 96"/>
         <p:cNvGrpSpPr/>
         <p:nvPr/>
       </p:nvGrpSpPr>
@@ -705,7 +709,7 @@
       </p:grpSpPr>
       <p:sp>
         <p:nvSpPr>
-          <p:cNvPr id="96" name="Shape 96"/>
+          <p:cNvPr id="97" name="Shape 97"/>
           <p:cNvSpPr/>
           <p:nvPr>
             <p:ph idx="2" type="sldImg"/>
@@ -739,7 +743,7 @@
       </p:sp>
       <p:sp>
         <p:nvSpPr>
-          <p:cNvPr id="97" name="Shape 97"/>
+          <p:cNvPr id="98" name="Shape 98"/>
           <p:cNvSpPr txBox="1"/>
           <p:nvPr>
             <p:ph idx="1" type="body"/>
@@ -775,7 +779,7 @@
   <p:cSld>
     <p:spTree>
       <p:nvGrpSpPr>
-        <p:cNvPr id="100" name="Shape 100"/>
+        <p:cNvPr id="101" name="Shape 101"/>
         <p:cNvGrpSpPr/>
         <p:nvPr/>
       </p:nvGrpSpPr>
@@ -789,7 +793,7 @@
       </p:grpSpPr>
       <p:sp>
         <p:nvSpPr>
-          <p:cNvPr id="101" name="Shape 101"/>
+          <p:cNvPr id="102" name="Shape 102"/>
           <p:cNvSpPr/>
           <p:nvPr>
             <p:ph idx="2" type="sldImg"/>
@@ -823,7 +827,7 @@
       </p:sp>
       <p:sp>
         <p:nvSpPr>
-          <p:cNvPr id="102" name="Shape 102"/>
+          <p:cNvPr id="103" name="Shape 103"/>
           <p:cNvSpPr txBox="1"/>
           <p:nvPr>
             <p:ph idx="1" type="body"/>
@@ -859,7 +863,7 @@
   <p:cSld>
     <p:spTree>
       <p:nvGrpSpPr>
-        <p:cNvPr id="105" name="Shape 105"/>
+        <p:cNvPr id="107" name="Shape 107"/>
         <p:cNvGrpSpPr/>
         <p:nvPr/>
       </p:nvGrpSpPr>
@@ -873,7 +877,7 @@
       </p:grpSpPr>
       <p:sp>
         <p:nvSpPr>
-          <p:cNvPr id="106" name="Shape 106"/>
+          <p:cNvPr id="108" name="Shape 108"/>
           <p:cNvSpPr/>
           <p:nvPr>
             <p:ph idx="2" type="sldImg"/>
@@ -907,7 +911,7 @@
       </p:sp>
       <p:sp>
         <p:nvSpPr>
-          <p:cNvPr id="107" name="Shape 107"/>
+          <p:cNvPr id="109" name="Shape 109"/>
           <p:cNvSpPr txBox="1"/>
           <p:nvPr>
             <p:ph idx="1" type="body"/>
@@ -943,7 +947,7 @@
   <p:cSld>
     <p:spTree>
       <p:nvGrpSpPr>
-        <p:cNvPr id="111" name="Shape 111"/>
+        <p:cNvPr id="112" name="Shape 112"/>
         <p:cNvGrpSpPr/>
         <p:nvPr/>
       </p:nvGrpSpPr>
@@ -957,7 +961,7 @@
       </p:grpSpPr>
       <p:sp>
         <p:nvSpPr>
-          <p:cNvPr id="112" name="Shape 112"/>
+          <p:cNvPr id="113" name="Shape 113"/>
           <p:cNvSpPr/>
           <p:nvPr>
             <p:ph idx="2" type="sldImg"/>
@@ -991,7 +995,7 @@
       </p:sp>
       <p:sp>
         <p:nvSpPr>
-          <p:cNvPr id="113" name="Shape 113"/>
+          <p:cNvPr id="114" name="Shape 114"/>
           <p:cNvSpPr txBox="1"/>
           <p:nvPr>
             <p:ph idx="1" type="body"/>
@@ -1106,6 +1110,174 @@
 </p:notes>
 </file>
 
+<file path=ppt/notesSlides/notesSlide18.xml><?xml version="1.0" encoding="utf-8"?>
+<p:notes xmlns:a="http://schemas.openxmlformats.org/drawingml/2006/main" xmlns:r="http://schemas.openxmlformats.org/officeDocument/2006/relationships" xmlns:mc="http://schemas.openxmlformats.org/markup-compatibility/2006" xmlns:mv="urn:schemas-microsoft-com:mac:vml" xmlns:p="http://schemas.openxmlformats.org/presentationml/2006/main" xmlns:c="http://schemas.openxmlformats.org/drawingml/2006/chart" xmlns:dgm="http://schemas.openxmlformats.org/drawingml/2006/diagram" xmlns:o="urn:schemas-microsoft-com:office:office" xmlns:v="urn:schemas-microsoft-com:vml" xmlns:pvml="urn:schemas-microsoft-com:office:powerpoint" xmlns:com="http://schemas.openxmlformats.org/drawingml/2006/compatibility" xmlns:p14="http://schemas.microsoft.com/office/powerpoint/2010/main" showMasterSp="0" showMasterPhAnim="0">
+  <p:cSld>
+    <p:spTree>
+      <p:nvGrpSpPr>
+        <p:cNvPr id="123" name="Shape 123"/>
+        <p:cNvGrpSpPr/>
+        <p:nvPr/>
+      </p:nvGrpSpPr>
+      <p:grpSpPr>
+        <a:xfrm>
+          <a:off y="0" x="0"/>
+          <a:ext cy="0" cx="0"/>
+          <a:chOff y="0" x="0"/>
+          <a:chExt cy="0" cx="0"/>
+        </a:xfrm>
+      </p:grpSpPr>
+      <p:sp>
+        <p:nvSpPr>
+          <p:cNvPr id="124" name="Shape 124"/>
+          <p:cNvSpPr/>
+          <p:nvPr>
+            <p:ph idx="2" type="sldImg"/>
+          </p:nvPr>
+        </p:nvSpPr>
+        <p:spPr>
+          <a:xfrm>
+            <a:off y="685800" x="381187"/>
+            <a:ext cy="3429000" cx="6096299"/>
+          </a:xfrm>
+          <a:custGeom>
+            <a:pathLst>
+              <a:path w="120000" extrusionOk="0" h="120000">
+                <a:moveTo>
+                  <a:pt y="0" x="0"/>
+                </a:moveTo>
+                <a:lnTo>
+                  <a:pt y="0" x="120000"/>
+                </a:lnTo>
+                <a:lnTo>
+                  <a:pt y="120000" x="120000"/>
+                </a:lnTo>
+                <a:lnTo>
+                  <a:pt y="120000" x="0"/>
+                </a:lnTo>
+                <a:close/>
+              </a:path>
+            </a:pathLst>
+          </a:custGeom>
+        </p:spPr>
+      </p:sp>
+      <p:sp>
+        <p:nvSpPr>
+          <p:cNvPr id="125" name="Shape 125"/>
+          <p:cNvSpPr txBox="1"/>
+          <p:nvPr>
+            <p:ph idx="1" type="body"/>
+          </p:nvPr>
+        </p:nvSpPr>
+        <p:spPr>
+          <a:xfrm>
+            <a:off y="4343400" x="685800"/>
+            <a:ext cy="4114800" cx="5486399"/>
+          </a:xfrm>
+          <a:prstGeom prst="rect">
+            <a:avLst/>
+          </a:prstGeom>
+        </p:spPr>
+        <p:txBody>
+          <a:bodyPr bIns="91425" rIns="91425" lIns="91425" tIns="91425" anchor="t" anchorCtr="0">
+            <a:noAutofit/>
+          </a:bodyPr>
+          <a:lstStyle/>
+          <a:p/>
+        </p:txBody>
+      </p:sp>
+    </p:spTree>
+  </p:cSld>
+  <p:clrMapOvr>
+    <a:masterClrMapping/>
+  </p:clrMapOvr>
+</p:notes>
+</file>
+
+<file path=ppt/notesSlides/notesSlide19.xml><?xml version="1.0" encoding="utf-8"?>
+<p:notes xmlns:a="http://schemas.openxmlformats.org/drawingml/2006/main" xmlns:r="http://schemas.openxmlformats.org/officeDocument/2006/relationships" xmlns:mc="http://schemas.openxmlformats.org/markup-compatibility/2006" xmlns:mv="urn:schemas-microsoft-com:mac:vml" xmlns:p="http://schemas.openxmlformats.org/presentationml/2006/main" xmlns:c="http://schemas.openxmlformats.org/drawingml/2006/chart" xmlns:dgm="http://schemas.openxmlformats.org/drawingml/2006/diagram" xmlns:o="urn:schemas-microsoft-com:office:office" xmlns:v="urn:schemas-microsoft-com:vml" xmlns:pvml="urn:schemas-microsoft-com:office:powerpoint" xmlns:com="http://schemas.openxmlformats.org/drawingml/2006/compatibility" xmlns:p14="http://schemas.microsoft.com/office/powerpoint/2010/main" showMasterSp="0" showMasterPhAnim="0">
+  <p:cSld>
+    <p:spTree>
+      <p:nvGrpSpPr>
+        <p:cNvPr id="128" name="Shape 128"/>
+        <p:cNvGrpSpPr/>
+        <p:nvPr/>
+      </p:nvGrpSpPr>
+      <p:grpSpPr>
+        <a:xfrm>
+          <a:off y="0" x="0"/>
+          <a:ext cy="0" cx="0"/>
+          <a:chOff y="0" x="0"/>
+          <a:chExt cy="0" cx="0"/>
+        </a:xfrm>
+      </p:grpSpPr>
+      <p:sp>
+        <p:nvSpPr>
+          <p:cNvPr id="129" name="Shape 129"/>
+          <p:cNvSpPr/>
+          <p:nvPr>
+            <p:ph idx="2" type="sldImg"/>
+          </p:nvPr>
+        </p:nvSpPr>
+        <p:spPr>
+          <a:xfrm>
+            <a:off y="685800" x="381187"/>
+            <a:ext cy="3429000" cx="6096299"/>
+          </a:xfrm>
+          <a:custGeom>
+            <a:pathLst>
+              <a:path w="120000" extrusionOk="0" h="120000">
+                <a:moveTo>
+                  <a:pt y="0" x="0"/>
+                </a:moveTo>
+                <a:lnTo>
+                  <a:pt y="0" x="120000"/>
+                </a:lnTo>
+                <a:lnTo>
+                  <a:pt y="120000" x="120000"/>
+                </a:lnTo>
+                <a:lnTo>
+                  <a:pt y="120000" x="0"/>
+                </a:lnTo>
+                <a:close/>
+              </a:path>
+            </a:pathLst>
+          </a:custGeom>
+        </p:spPr>
+      </p:sp>
+      <p:sp>
+        <p:nvSpPr>
+          <p:cNvPr id="130" name="Shape 130"/>
+          <p:cNvSpPr txBox="1"/>
+          <p:nvPr>
+            <p:ph idx="1" type="body"/>
+          </p:nvPr>
+        </p:nvSpPr>
+        <p:spPr>
+          <a:xfrm>
+            <a:off y="4343400" x="685800"/>
+            <a:ext cy="4114800" cx="5486399"/>
+          </a:xfrm>
+          <a:prstGeom prst="rect">
+            <a:avLst/>
+          </a:prstGeom>
+        </p:spPr>
+        <p:txBody>
+          <a:bodyPr bIns="91425" rIns="91425" lIns="91425" tIns="91425" anchor="t" anchorCtr="0">
+            <a:noAutofit/>
+          </a:bodyPr>
+          <a:lstStyle/>
+          <a:p/>
+        </p:txBody>
+      </p:sp>
+    </p:spTree>
+  </p:cSld>
+  <p:clrMapOvr>
+    <a:masterClrMapping/>
+  </p:clrMapOvr>
+</p:notes>
+</file>
+
 <file path=ppt/notesSlides/notesSlide2.xml><?xml version="1.0" encoding="utf-8"?>
 <p:notes xmlns:a="http://schemas.openxmlformats.org/drawingml/2006/main" xmlns:r="http://schemas.openxmlformats.org/officeDocument/2006/relationships" xmlns:mc="http://schemas.openxmlformats.org/markup-compatibility/2006" xmlns:mv="urn:schemas-microsoft-com:mac:vml" xmlns:p="http://schemas.openxmlformats.org/presentationml/2006/main" xmlns:c="http://schemas.openxmlformats.org/drawingml/2006/chart" xmlns:dgm="http://schemas.openxmlformats.org/drawingml/2006/diagram" xmlns:o="urn:schemas-microsoft-com:office:office" xmlns:v="urn:schemas-microsoft-com:vml" xmlns:pvml="urn:schemas-microsoft-com:office:powerpoint" xmlns:com="http://schemas.openxmlformats.org/drawingml/2006/compatibility" xmlns:p14="http://schemas.microsoft.com/office/powerpoint/2010/main" showMasterSp="0" showMasterPhAnim="0">
   <p:cSld>
@@ -1160,6 +1332,174 @@
       <p:sp>
         <p:nvSpPr>
           <p:cNvPr id="33" name="Shape 33"/>
+          <p:cNvSpPr txBox="1"/>
+          <p:nvPr>
+            <p:ph idx="1" type="body"/>
+          </p:nvPr>
+        </p:nvSpPr>
+        <p:spPr>
+          <a:xfrm>
+            <a:off y="4343400" x="685800"/>
+            <a:ext cy="4114800" cx="5486399"/>
+          </a:xfrm>
+          <a:prstGeom prst="rect">
+            <a:avLst/>
+          </a:prstGeom>
+        </p:spPr>
+        <p:txBody>
+          <a:bodyPr bIns="91425" rIns="91425" lIns="91425" tIns="91425" anchor="t" anchorCtr="0">
+            <a:noAutofit/>
+          </a:bodyPr>
+          <a:lstStyle/>
+          <a:p/>
+        </p:txBody>
+      </p:sp>
+    </p:spTree>
+  </p:cSld>
+  <p:clrMapOvr>
+    <a:masterClrMapping/>
+  </p:clrMapOvr>
+</p:notes>
+</file>
+
+<file path=ppt/notesSlides/notesSlide20.xml><?xml version="1.0" encoding="utf-8"?>
+<p:notes xmlns:a="http://schemas.openxmlformats.org/drawingml/2006/main" xmlns:r="http://schemas.openxmlformats.org/officeDocument/2006/relationships" xmlns:mc="http://schemas.openxmlformats.org/markup-compatibility/2006" xmlns:mv="urn:schemas-microsoft-com:mac:vml" xmlns:p="http://schemas.openxmlformats.org/presentationml/2006/main" xmlns:c="http://schemas.openxmlformats.org/drawingml/2006/chart" xmlns:dgm="http://schemas.openxmlformats.org/drawingml/2006/diagram" xmlns:o="urn:schemas-microsoft-com:office:office" xmlns:v="urn:schemas-microsoft-com:vml" xmlns:pvml="urn:schemas-microsoft-com:office:powerpoint" xmlns:com="http://schemas.openxmlformats.org/drawingml/2006/compatibility" xmlns:p14="http://schemas.microsoft.com/office/powerpoint/2010/main" showMasterSp="0" showMasterPhAnim="0">
+  <p:cSld>
+    <p:spTree>
+      <p:nvGrpSpPr>
+        <p:cNvPr id="133" name="Shape 133"/>
+        <p:cNvGrpSpPr/>
+        <p:nvPr/>
+      </p:nvGrpSpPr>
+      <p:grpSpPr>
+        <a:xfrm>
+          <a:off y="0" x="0"/>
+          <a:ext cy="0" cx="0"/>
+          <a:chOff y="0" x="0"/>
+          <a:chExt cy="0" cx="0"/>
+        </a:xfrm>
+      </p:grpSpPr>
+      <p:sp>
+        <p:nvSpPr>
+          <p:cNvPr id="134" name="Shape 134"/>
+          <p:cNvSpPr/>
+          <p:nvPr>
+            <p:ph idx="2" type="sldImg"/>
+          </p:nvPr>
+        </p:nvSpPr>
+        <p:spPr>
+          <a:xfrm>
+            <a:off y="685800" x="381187"/>
+            <a:ext cy="3429000" cx="6096299"/>
+          </a:xfrm>
+          <a:custGeom>
+            <a:pathLst>
+              <a:path w="120000" extrusionOk="0" h="120000">
+                <a:moveTo>
+                  <a:pt y="0" x="0"/>
+                </a:moveTo>
+                <a:lnTo>
+                  <a:pt y="0" x="120000"/>
+                </a:lnTo>
+                <a:lnTo>
+                  <a:pt y="120000" x="120000"/>
+                </a:lnTo>
+                <a:lnTo>
+                  <a:pt y="120000" x="0"/>
+                </a:lnTo>
+                <a:close/>
+              </a:path>
+            </a:pathLst>
+          </a:custGeom>
+        </p:spPr>
+      </p:sp>
+      <p:sp>
+        <p:nvSpPr>
+          <p:cNvPr id="135" name="Shape 135"/>
+          <p:cNvSpPr txBox="1"/>
+          <p:nvPr>
+            <p:ph idx="1" type="body"/>
+          </p:nvPr>
+        </p:nvSpPr>
+        <p:spPr>
+          <a:xfrm>
+            <a:off y="4343400" x="685800"/>
+            <a:ext cy="4114800" cx="5486399"/>
+          </a:xfrm>
+          <a:prstGeom prst="rect">
+            <a:avLst/>
+          </a:prstGeom>
+        </p:spPr>
+        <p:txBody>
+          <a:bodyPr bIns="91425" rIns="91425" lIns="91425" tIns="91425" anchor="t" anchorCtr="0">
+            <a:noAutofit/>
+          </a:bodyPr>
+          <a:lstStyle/>
+          <a:p/>
+        </p:txBody>
+      </p:sp>
+    </p:spTree>
+  </p:cSld>
+  <p:clrMapOvr>
+    <a:masterClrMapping/>
+  </p:clrMapOvr>
+</p:notes>
+</file>
+
+<file path=ppt/notesSlides/notesSlide21.xml><?xml version="1.0" encoding="utf-8"?>
+<p:notes xmlns:a="http://schemas.openxmlformats.org/drawingml/2006/main" xmlns:r="http://schemas.openxmlformats.org/officeDocument/2006/relationships" xmlns:mc="http://schemas.openxmlformats.org/markup-compatibility/2006" xmlns:mv="urn:schemas-microsoft-com:mac:vml" xmlns:p="http://schemas.openxmlformats.org/presentationml/2006/main" xmlns:c="http://schemas.openxmlformats.org/drawingml/2006/chart" xmlns:dgm="http://schemas.openxmlformats.org/drawingml/2006/diagram" xmlns:o="urn:schemas-microsoft-com:office:office" xmlns:v="urn:schemas-microsoft-com:vml" xmlns:pvml="urn:schemas-microsoft-com:office:powerpoint" xmlns:com="http://schemas.openxmlformats.org/drawingml/2006/compatibility" xmlns:p14="http://schemas.microsoft.com/office/powerpoint/2010/main" showMasterSp="0" showMasterPhAnim="0">
+  <p:cSld>
+    <p:spTree>
+      <p:nvGrpSpPr>
+        <p:cNvPr id="138" name="Shape 138"/>
+        <p:cNvGrpSpPr/>
+        <p:nvPr/>
+      </p:nvGrpSpPr>
+      <p:grpSpPr>
+        <a:xfrm>
+          <a:off y="0" x="0"/>
+          <a:ext cy="0" cx="0"/>
+          <a:chOff y="0" x="0"/>
+          <a:chExt cy="0" cx="0"/>
+        </a:xfrm>
+      </p:grpSpPr>
+      <p:sp>
+        <p:nvSpPr>
+          <p:cNvPr id="139" name="Shape 139"/>
+          <p:cNvSpPr/>
+          <p:nvPr>
+            <p:ph idx="2" type="sldImg"/>
+          </p:nvPr>
+        </p:nvSpPr>
+        <p:spPr>
+          <a:xfrm>
+            <a:off y="685800" x="381187"/>
+            <a:ext cy="3429000" cx="6096299"/>
+          </a:xfrm>
+          <a:custGeom>
+            <a:pathLst>
+              <a:path w="120000" extrusionOk="0" h="120000">
+                <a:moveTo>
+                  <a:pt y="0" x="0"/>
+                </a:moveTo>
+                <a:lnTo>
+                  <a:pt y="0" x="120000"/>
+                </a:lnTo>
+                <a:lnTo>
+                  <a:pt y="120000" x="120000"/>
+                </a:lnTo>
+                <a:lnTo>
+                  <a:pt y="120000" x="0"/>
+                </a:lnTo>
+                <a:close/>
+              </a:path>
+            </a:pathLst>
+          </a:custGeom>
+        </p:spPr>
+      </p:sp>
+      <p:sp>
+        <p:nvSpPr>
+          <p:cNvPr id="140" name="Shape 140"/>
           <p:cNvSpPr txBox="1"/>
           <p:nvPr>
             <p:ph idx="1" type="body"/>
@@ -3459,7 +3799,7 @@
             <a:tbl>
               <a:tblPr>
                 <a:noFill/>
-                <a:tableStyleId>{D5094FAF-60CE-497B-81B1-81723A3608F1}</a:tableStyleId>
+                <a:tableStyleId>{33C6B6F2-3FEF-4E1E-8643-E126265D6C57}</a:tableStyleId>
               </a:tblPr>
               <a:tblGrid>
                 <a:gridCol w="1438275"/>
@@ -7179,139 +7519,9 @@
           <a:chExt cy="0" cx="0"/>
         </a:xfrm>
       </p:grpSpPr>
-      <p:pic>
-        <p:nvPicPr>
-          <p:cNvPr id="78" name="Shape 78"/>
-          <p:cNvPicPr preferRelativeResize="0"/>
-          <p:nvPr/>
-        </p:nvPicPr>
-        <p:blipFill>
-          <a:blip r:embed="rId3"/>
-          <a:stretch>
-            <a:fillRect/>
-          </a:stretch>
-        </p:blipFill>
-        <p:spPr>
-          <a:xfrm>
-            <a:off y="619462" x="1414662"/>
-            <a:ext cy="3904574" cx="6314674"/>
-          </a:xfrm>
-          <a:prstGeom prst="rect">
-            <a:avLst/>
-          </a:prstGeom>
-        </p:spPr>
-      </p:pic>
-    </p:spTree>
-  </p:cSld>
-  <p:clrMapOvr>
-    <a:masterClrMapping/>
-  </p:clrMapOvr>
-  <p:transition spd="slow">
-    <p:cut/>
-  </p:transition>
-</p:sld>
-</file>
-
-<file path=ppt/slides/slide12.xml><?xml version="1.0" encoding="utf-8"?>
-<p:sld xmlns:a="http://schemas.openxmlformats.org/drawingml/2006/main" xmlns:r="http://schemas.openxmlformats.org/officeDocument/2006/relationships" xmlns:mc="http://schemas.openxmlformats.org/markup-compatibility/2006" xmlns:mv="urn:schemas-microsoft-com:mac:vml" xmlns:p="http://schemas.openxmlformats.org/presentationml/2006/main" xmlns:c="http://schemas.openxmlformats.org/drawingml/2006/chart" xmlns:dgm="http://schemas.openxmlformats.org/drawingml/2006/diagram" xmlns:o="urn:schemas-microsoft-com:office:office" xmlns:v="urn:schemas-microsoft-com:vml" xmlns:pvml="urn:schemas-microsoft-com:office:powerpoint" xmlns:com="http://schemas.openxmlformats.org/drawingml/2006/compatibility" xmlns:p14="http://schemas.microsoft.com/office/powerpoint/2010/main">
-  <p:cSld>
-    <p:spTree>
-      <p:nvGrpSpPr>
-        <p:cNvPr id="82" name="Shape 82"/>
-        <p:cNvGrpSpPr/>
-        <p:nvPr/>
-      </p:nvGrpSpPr>
-      <p:grpSpPr>
-        <a:xfrm>
-          <a:off y="0" x="0"/>
-          <a:ext cy="0" cx="0"/>
-          <a:chOff y="0" x="0"/>
-          <a:chExt cy="0" cx="0"/>
-        </a:xfrm>
-      </p:grpSpPr>
       <p:sp>
         <p:nvSpPr>
-          <p:cNvPr id="83" name="Shape 83"/>
-          <p:cNvSpPr txBox="1"/>
-          <p:nvPr>
-            <p:ph idx="1" type="body"/>
-          </p:nvPr>
-        </p:nvSpPr>
-        <p:spPr>
-          <a:xfrm>
-            <a:off y="1200150" x="457200"/>
-            <a:ext cy="3725699" cx="8229600"/>
-          </a:xfrm>
-          <a:prstGeom prst="rect">
-            <a:avLst/>
-          </a:prstGeom>
-        </p:spPr>
-        <p:txBody>
-          <a:bodyPr bIns="91425" rIns="91425" lIns="91425" tIns="91425" anchor="t" anchorCtr="0">
-            <a:noAutofit/>
-          </a:bodyPr>
-          <a:lstStyle/>
-          <a:p>
-            <a:pPr rtl="0" lvl="0" indent="-419100" marL="914400">
-              <a:buClr>
-                <a:schemeClr val="lt1"/>
-              </a:buClr>
-              <a:buSzPct val="166666"/>
-              <a:buFont typeface="Arial"/>
-              <a:buChar char="•"/>
-            </a:pPr>
-            <a:r>
-              <a:rPr lang="en"/>
-              <a:t>Use Cases</a:t>
-            </a:r>
-          </a:p>
-          <a:p>
-            <a:pPr rtl="0" lvl="0" indent="-419100" marL="914400">
-              <a:buClr>
-                <a:schemeClr val="lt1"/>
-              </a:buClr>
-              <a:buSzPct val="166666"/>
-              <a:buFont typeface="Arial"/>
-              <a:buChar char="•"/>
-            </a:pPr>
-            <a:r>
-              <a:rPr lang="en"/>
-              <a:t>User Interface mockups</a:t>
-            </a:r>
-          </a:p>
-          <a:p>
-            <a:pPr rtl="0" lvl="0" indent="-419100" marL="914400">
-              <a:buClr>
-                <a:schemeClr val="lt1"/>
-              </a:buClr>
-              <a:buSzPct val="166666"/>
-              <a:buFont typeface="Arial"/>
-              <a:buChar char="•"/>
-            </a:pPr>
-            <a:r>
-              <a:rPr lang="en"/>
-              <a:t>Data Flow and UML</a:t>
-            </a:r>
-          </a:p>
-          <a:p>
-            <a:pPr lvl="0" indent="-419100" marL="914400">
-              <a:buClr>
-                <a:schemeClr val="lt1"/>
-              </a:buClr>
-              <a:buSzPct val="166666"/>
-              <a:buFont typeface="Arial"/>
-              <a:buChar char="•"/>
-            </a:pPr>
-            <a:r>
-              <a:rPr lang="en"/>
-              <a:t>Test plan</a:t>
-            </a:r>
-          </a:p>
-        </p:txBody>
-      </p:sp>
-      <p:sp>
-        <p:nvSpPr>
-          <p:cNvPr id="84" name="Shape 84"/>
+          <p:cNvPr id="78" name="Shape 78"/>
           <p:cNvSpPr txBox="1"/>
           <p:nvPr>
             <p:ph type="title"/>
@@ -7332,16 +7542,42 @@
           </a:bodyPr>
           <a:lstStyle/>
           <a:p>
-            <a:pPr indent="0" marL="457200">
+            <a:pPr>
               <a:buNone/>
             </a:pPr>
             <a:r>
               <a:rPr lang="en"/>
-              <a:t>Design</a:t>
+              <a:t>Project Timeline</a:t>
             </a:r>
           </a:p>
         </p:txBody>
       </p:sp>
+      <p:pic>
+        <p:nvPicPr>
+          <p:cNvPr id="79" name="Shape 79"/>
+          <p:cNvPicPr preferRelativeResize="0"/>
+          <p:nvPr/>
+        </p:nvPicPr>
+        <p:blipFill>
+          <a:blip r:embed="rId3"/>
+          <a:stretch>
+            <a:fillRect/>
+          </a:stretch>
+        </p:blipFill>
+        <p:spPr>
+          <a:xfrm>
+            <a:off y="1587033" x="615762"/>
+            <a:ext cy="1969432" cx="7912474"/>
+          </a:xfrm>
+          <a:prstGeom prst="rect">
+            <a:avLst/>
+          </a:prstGeom>
+          <a:noFill/>
+          <a:ln>
+            <a:noFill/>
+          </a:ln>
+        </p:spPr>
+      </p:pic>
     </p:spTree>
   </p:cSld>
   <p:clrMapOvr>
@@ -7353,12 +7589,12 @@
 </p:sld>
 </file>
 
-<file path=ppt/slides/slide13.xml><?xml version="1.0" encoding="utf-8"?>
+<file path=ppt/slides/slide12.xml><?xml version="1.0" encoding="utf-8"?>
 <p:sld xmlns:a="http://schemas.openxmlformats.org/drawingml/2006/main" xmlns:r="http://schemas.openxmlformats.org/officeDocument/2006/relationships" xmlns:mc="http://schemas.openxmlformats.org/markup-compatibility/2006" xmlns:mv="urn:schemas-microsoft-com:mac:vml" xmlns:p="http://schemas.openxmlformats.org/presentationml/2006/main" xmlns:c="http://schemas.openxmlformats.org/drawingml/2006/chart" xmlns:dgm="http://schemas.openxmlformats.org/drawingml/2006/diagram" xmlns:o="urn:schemas-microsoft-com:office:office" xmlns:v="urn:schemas-microsoft-com:vml" xmlns:pvml="urn:schemas-microsoft-com:office:powerpoint" xmlns:com="http://schemas.openxmlformats.org/drawingml/2006/compatibility" xmlns:p14="http://schemas.microsoft.com/office/powerpoint/2010/main">
   <p:cSld>
     <p:spTree>
       <p:nvGrpSpPr>
-        <p:cNvPr id="88" name="Shape 88"/>
+        <p:cNvPr id="83" name="Shape 83"/>
         <p:cNvGrpSpPr/>
         <p:nvPr/>
       </p:nvGrpSpPr>
@@ -7372,7 +7608,7 @@
       </p:grpSpPr>
       <p:sp>
         <p:nvSpPr>
-          <p:cNvPr id="89" name="Shape 89"/>
+          <p:cNvPr id="84" name="Shape 84"/>
           <p:cNvSpPr txBox="1"/>
           <p:nvPr>
             <p:ph type="title"/>
@@ -7405,7 +7641,7 @@
       </p:sp>
       <p:sp>
         <p:nvSpPr>
-          <p:cNvPr id="90" name="Shape 90"/>
+          <p:cNvPr id="85" name="Shape 85"/>
           <p:cNvSpPr txBox="1"/>
           <p:nvPr>
             <p:ph idx="1" type="body"/>
@@ -7493,25 +7729,11 @@
               <a:t>(http://www.sourcetreeapp.com)</a:t>
             </a:r>
           </a:p>
-          <a:p>
-            <a:pPr rtl="0" lvl="0" indent="-419100" marL="914400">
-              <a:buClr>
-                <a:schemeClr val="lt1"/>
-              </a:buClr>
-              <a:buSzPct val="166666"/>
-              <a:buFont typeface="Arial"/>
-              <a:buChar char="•"/>
-            </a:pPr>
-            <a:r>
-              <a:rPr lang="en"/>
-              <a:t>Pen and paper</a:t>
-            </a:r>
-          </a:p>
         </p:txBody>
       </p:sp>
       <p:pic>
         <p:nvPicPr>
-          <p:cNvPr id="91" name="Shape 91"/>
+          <p:cNvPr id="86" name="Shape 86"/>
           <p:cNvPicPr preferRelativeResize="0"/>
           <p:nvPr/>
         </p:nvPicPr>
@@ -7533,7 +7755,7 @@
       </p:pic>
       <p:pic>
         <p:nvPicPr>
-          <p:cNvPr id="92" name="Shape 92"/>
+          <p:cNvPr id="87" name="Shape 87"/>
           <p:cNvPicPr preferRelativeResize="0"/>
           <p:nvPr/>
         </p:nvPicPr>
@@ -7555,7 +7777,7 @@
       </p:pic>
       <p:pic>
         <p:nvPicPr>
-          <p:cNvPr id="93" name="Shape 93"/>
+          <p:cNvPr id="88" name="Shape 88"/>
           <p:cNvPicPr preferRelativeResize="0"/>
           <p:nvPr/>
         </p:nvPicPr>
@@ -7577,7 +7799,7 @@
       </p:pic>
       <p:pic>
         <p:nvPicPr>
-          <p:cNvPr id="94" name="Shape 94"/>
+          <p:cNvPr id="89" name="Shape 89"/>
           <p:cNvPicPr preferRelativeResize="0"/>
           <p:nvPr/>
         </p:nvPicPr>
@@ -7608,12 +7830,153 @@
 </p:sld>
 </file>
 
+<file path=ppt/slides/slide13.xml><?xml version="1.0" encoding="utf-8"?>
+<p:sld xmlns:a="http://schemas.openxmlformats.org/drawingml/2006/main" xmlns:r="http://schemas.openxmlformats.org/officeDocument/2006/relationships" xmlns:mc="http://schemas.openxmlformats.org/markup-compatibility/2006" xmlns:mv="urn:schemas-microsoft-com:mac:vml" xmlns:p="http://schemas.openxmlformats.org/presentationml/2006/main" xmlns:c="http://schemas.openxmlformats.org/drawingml/2006/chart" xmlns:dgm="http://schemas.openxmlformats.org/drawingml/2006/diagram" xmlns:o="urn:schemas-microsoft-com:office:office" xmlns:v="urn:schemas-microsoft-com:vml" xmlns:pvml="urn:schemas-microsoft-com:office:powerpoint" xmlns:com="http://schemas.openxmlformats.org/drawingml/2006/compatibility" xmlns:p14="http://schemas.microsoft.com/office/powerpoint/2010/main">
+  <p:cSld>
+    <p:spTree>
+      <p:nvGrpSpPr>
+        <p:cNvPr id="93" name="Shape 93"/>
+        <p:cNvGrpSpPr/>
+        <p:nvPr/>
+      </p:nvGrpSpPr>
+      <p:grpSpPr>
+        <a:xfrm>
+          <a:off y="0" x="0"/>
+          <a:ext cy="0" cx="0"/>
+          <a:chOff y="0" x="0"/>
+          <a:chExt cy="0" cx="0"/>
+        </a:xfrm>
+      </p:grpSpPr>
+      <p:sp>
+        <p:nvSpPr>
+          <p:cNvPr id="94" name="Shape 94"/>
+          <p:cNvSpPr txBox="1"/>
+          <p:nvPr>
+            <p:ph type="title"/>
+          </p:nvPr>
+        </p:nvSpPr>
+        <p:spPr>
+          <a:xfrm>
+            <a:off y="205978" x="457200"/>
+            <a:ext cy="857400" cx="8229600"/>
+          </a:xfrm>
+          <a:prstGeom prst="rect">
+            <a:avLst/>
+          </a:prstGeom>
+        </p:spPr>
+        <p:txBody>
+          <a:bodyPr bIns="91425" rIns="91425" lIns="91425" tIns="91425" anchor="b" anchorCtr="0">
+            <a:noAutofit/>
+          </a:bodyPr>
+          <a:lstStyle/>
+          <a:p>
+            <a:pPr>
+              <a:buNone/>
+            </a:pPr>
+            <a:r>
+              <a:rPr lang="en"/>
+              <a:t>More Tools</a:t>
+            </a:r>
+          </a:p>
+        </p:txBody>
+      </p:sp>
+      <p:sp>
+        <p:nvSpPr>
+          <p:cNvPr id="95" name="Shape 95"/>
+          <p:cNvSpPr txBox="1"/>
+          <p:nvPr>
+            <p:ph idx="1" type="body"/>
+          </p:nvPr>
+        </p:nvSpPr>
+        <p:spPr>
+          <a:xfrm>
+            <a:off y="1200150" x="457200"/>
+            <a:ext cy="3725699" cx="8229600"/>
+          </a:xfrm>
+          <a:prstGeom prst="rect">
+            <a:avLst/>
+          </a:prstGeom>
+        </p:spPr>
+        <p:txBody>
+          <a:bodyPr bIns="91425" rIns="91425" lIns="91425" tIns="91425" anchor="t" anchorCtr="0">
+            <a:noAutofit/>
+          </a:bodyPr>
+          <a:lstStyle/>
+          <a:p>
+            <a:pPr rtl="0" lvl="0" indent="-419100" marL="457200">
+              <a:buClr>
+                <a:schemeClr val="lt1"/>
+              </a:buClr>
+              <a:buSzPct val="166666"/>
+              <a:buFont typeface="Arial"/>
+              <a:buChar char="•"/>
+            </a:pPr>
+            <a:r>
+              <a:rPr lang="en"/>
+              <a:t>Paint.NET</a:t>
+            </a:r>
+          </a:p>
+          <a:p>
+            <a:pPr rtl="0" lvl="0" indent="-419100" marL="457200">
+              <a:buClr>
+                <a:schemeClr val="lt1"/>
+              </a:buClr>
+              <a:buSzPct val="166666"/>
+              <a:buFont typeface="Arial"/>
+              <a:buChar char="•"/>
+            </a:pPr>
+            <a:r>
+              <a:rPr lang="en"/>
+              <a:t>Corel PaintShop Photo Pro X3</a:t>
+            </a:r>
+          </a:p>
+          <a:p>
+            <a:pPr rtl="0" lvl="0" indent="-419100" marL="457200">
+              <a:buClr>
+                <a:schemeClr val="lt1"/>
+              </a:buClr>
+              <a:buSzPct val="166666"/>
+              <a:buFont typeface="Arial"/>
+              <a:buChar char="•"/>
+            </a:pPr>
+            <a:r>
+              <a:rPr lang="en"/>
+              <a:t>Adobe Photoshop CS5.1</a:t>
+            </a:r>
+          </a:p>
+          <a:p>
+            <a:pPr rtl="0" lvl="0" indent="-419100" marL="457200">
+              <a:buClr>
+                <a:schemeClr val="lt1"/>
+              </a:buClr>
+              <a:buSzPct val="166666"/>
+              <a:buFont typeface="Arial"/>
+              <a:buChar char="•"/>
+            </a:pPr>
+            <a:r>
+              <a:rPr lang="en"/>
+              <a:t>Pen and paper</a:t>
+            </a:r>
+          </a:p>
+        </p:txBody>
+      </p:sp>
+    </p:spTree>
+  </p:cSld>
+  <p:clrMapOvr>
+    <a:masterClrMapping/>
+  </p:clrMapOvr>
+  <p:transition spd="slow">
+    <p:cut/>
+  </p:transition>
+</p:sld>
+</file>
+
 <file path=ppt/slides/slide14.xml><?xml version="1.0" encoding="utf-8"?>
 <p:sld xmlns:a="http://schemas.openxmlformats.org/drawingml/2006/main" xmlns:r="http://schemas.openxmlformats.org/officeDocument/2006/relationships" xmlns:mc="http://schemas.openxmlformats.org/markup-compatibility/2006" xmlns:mv="urn:schemas-microsoft-com:mac:vml" xmlns:p="http://schemas.openxmlformats.org/presentationml/2006/main" xmlns:c="http://schemas.openxmlformats.org/drawingml/2006/chart" xmlns:dgm="http://schemas.openxmlformats.org/drawingml/2006/diagram" xmlns:o="urn:schemas-microsoft-com:office:office" xmlns:v="urn:schemas-microsoft-com:vml" xmlns:pvml="urn:schemas-microsoft-com:office:powerpoint" xmlns:com="http://schemas.openxmlformats.org/drawingml/2006/compatibility" xmlns:p14="http://schemas.microsoft.com/office/powerpoint/2010/main">
   <p:cSld>
     <p:spTree>
       <p:nvGrpSpPr>
-        <p:cNvPr id="98" name="Shape 98"/>
+        <p:cNvPr id="99" name="Shape 99"/>
         <p:cNvGrpSpPr/>
         <p:nvPr/>
       </p:nvGrpSpPr>
@@ -7627,7 +7990,198 @@
       </p:grpSpPr>
       <p:pic>
         <p:nvPicPr>
-          <p:cNvPr id="99" name="Shape 99"/>
+          <p:cNvPr id="100" name="Shape 100"/>
+          <p:cNvPicPr preferRelativeResize="0"/>
+          <p:nvPr/>
+        </p:nvPicPr>
+        <p:blipFill>
+          <a:blip r:embed="rId3"/>
+          <a:stretch>
+            <a:fillRect/>
+          </a:stretch>
+        </p:blipFill>
+        <p:spPr>
+          <a:xfrm>
+            <a:off y="619462" x="1414662"/>
+            <a:ext cy="3904574" cx="6314674"/>
+          </a:xfrm>
+          <a:prstGeom prst="rect">
+            <a:avLst/>
+          </a:prstGeom>
+        </p:spPr>
+      </p:pic>
+    </p:spTree>
+  </p:cSld>
+  <p:clrMapOvr>
+    <a:masterClrMapping/>
+  </p:clrMapOvr>
+  <p:transition spd="slow">
+    <p:cut/>
+  </p:transition>
+</p:sld>
+</file>
+
+<file path=ppt/slides/slide15.xml><?xml version="1.0" encoding="utf-8"?>
+<p:sld xmlns:a="http://schemas.openxmlformats.org/drawingml/2006/main" xmlns:r="http://schemas.openxmlformats.org/officeDocument/2006/relationships" xmlns:mc="http://schemas.openxmlformats.org/markup-compatibility/2006" xmlns:mv="urn:schemas-microsoft-com:mac:vml" xmlns:p="http://schemas.openxmlformats.org/presentationml/2006/main" xmlns:c="http://schemas.openxmlformats.org/drawingml/2006/chart" xmlns:dgm="http://schemas.openxmlformats.org/drawingml/2006/diagram" xmlns:o="urn:schemas-microsoft-com:office:office" xmlns:v="urn:schemas-microsoft-com:vml" xmlns:pvml="urn:schemas-microsoft-com:office:powerpoint" xmlns:com="http://schemas.openxmlformats.org/drawingml/2006/compatibility" xmlns:p14="http://schemas.microsoft.com/office/powerpoint/2010/main">
+  <p:cSld>
+    <p:spTree>
+      <p:nvGrpSpPr>
+        <p:cNvPr id="104" name="Shape 104"/>
+        <p:cNvGrpSpPr/>
+        <p:nvPr/>
+      </p:nvGrpSpPr>
+      <p:grpSpPr>
+        <a:xfrm>
+          <a:off y="0" x="0"/>
+          <a:ext cy="0" cx="0"/>
+          <a:chOff y="0" x="0"/>
+          <a:chExt cy="0" cx="0"/>
+        </a:xfrm>
+      </p:grpSpPr>
+      <p:sp>
+        <p:nvSpPr>
+          <p:cNvPr id="105" name="Shape 105"/>
+          <p:cNvSpPr txBox="1"/>
+          <p:nvPr>
+            <p:ph idx="1" type="body"/>
+          </p:nvPr>
+        </p:nvSpPr>
+        <p:spPr>
+          <a:xfrm>
+            <a:off y="1200150" x="457200"/>
+            <a:ext cy="3725699" cx="8229600"/>
+          </a:xfrm>
+          <a:prstGeom prst="rect">
+            <a:avLst/>
+          </a:prstGeom>
+        </p:spPr>
+        <p:txBody>
+          <a:bodyPr bIns="91425" rIns="91425" lIns="91425" tIns="91425" anchor="t" anchorCtr="0">
+            <a:noAutofit/>
+          </a:bodyPr>
+          <a:lstStyle/>
+          <a:p>
+            <a:pPr rtl="0" lvl="0" indent="-419100" marL="914400">
+              <a:buClr>
+                <a:schemeClr val="lt1"/>
+              </a:buClr>
+              <a:buSzPct val="166666"/>
+              <a:buFont typeface="Arial"/>
+              <a:buChar char="•"/>
+            </a:pPr>
+            <a:r>
+              <a:rPr lang="en"/>
+              <a:t>Use Cases</a:t>
+            </a:r>
+          </a:p>
+          <a:p>
+            <a:pPr rtl="0" lvl="0" indent="-419100" marL="914400">
+              <a:buClr>
+                <a:schemeClr val="lt1"/>
+              </a:buClr>
+              <a:buSzPct val="166666"/>
+              <a:buFont typeface="Arial"/>
+              <a:buChar char="•"/>
+            </a:pPr>
+            <a:r>
+              <a:rPr lang="en"/>
+              <a:t>User Interface mockups</a:t>
+            </a:r>
+          </a:p>
+          <a:p>
+            <a:pPr rtl="0" lvl="0" indent="-419100" marL="914400">
+              <a:buClr>
+                <a:schemeClr val="lt1"/>
+              </a:buClr>
+              <a:buSzPct val="166666"/>
+              <a:buFont typeface="Arial"/>
+              <a:buChar char="•"/>
+            </a:pPr>
+            <a:r>
+              <a:rPr lang="en"/>
+              <a:t>Data Flow and UML</a:t>
+            </a:r>
+          </a:p>
+          <a:p>
+            <a:pPr lvl="0" indent="-419100" marL="914400">
+              <a:buClr>
+                <a:schemeClr val="lt1"/>
+              </a:buClr>
+              <a:buSzPct val="166666"/>
+              <a:buFont typeface="Arial"/>
+              <a:buChar char="•"/>
+            </a:pPr>
+            <a:r>
+              <a:rPr lang="en"/>
+              <a:t>Test plan</a:t>
+            </a:r>
+          </a:p>
+        </p:txBody>
+      </p:sp>
+      <p:sp>
+        <p:nvSpPr>
+          <p:cNvPr id="106" name="Shape 106"/>
+          <p:cNvSpPr txBox="1"/>
+          <p:nvPr>
+            <p:ph type="title"/>
+          </p:nvPr>
+        </p:nvSpPr>
+        <p:spPr>
+          <a:xfrm>
+            <a:off y="205978" x="457200"/>
+            <a:ext cy="857400" cx="8229600"/>
+          </a:xfrm>
+          <a:prstGeom prst="rect">
+            <a:avLst/>
+          </a:prstGeom>
+        </p:spPr>
+        <p:txBody>
+          <a:bodyPr bIns="91425" rIns="91425" lIns="91425" tIns="91425" anchor="b" anchorCtr="0">
+            <a:noAutofit/>
+          </a:bodyPr>
+          <a:lstStyle/>
+          <a:p>
+            <a:pPr indent="0" marL="457200">
+              <a:buNone/>
+            </a:pPr>
+            <a:r>
+              <a:rPr lang="en"/>
+              <a:t>Design</a:t>
+            </a:r>
+          </a:p>
+        </p:txBody>
+      </p:sp>
+    </p:spTree>
+  </p:cSld>
+  <p:clrMapOvr>
+    <a:masterClrMapping/>
+  </p:clrMapOvr>
+  <p:transition spd="slow">
+    <p:cut/>
+  </p:transition>
+</p:sld>
+</file>
+
+<file path=ppt/slides/slide16.xml><?xml version="1.0" encoding="utf-8"?>
+<p:sld xmlns:a="http://schemas.openxmlformats.org/drawingml/2006/main" xmlns:r="http://schemas.openxmlformats.org/officeDocument/2006/relationships" xmlns:mc="http://schemas.openxmlformats.org/markup-compatibility/2006" xmlns:mv="urn:schemas-microsoft-com:mac:vml" xmlns:p="http://schemas.openxmlformats.org/presentationml/2006/main" xmlns:c="http://schemas.openxmlformats.org/drawingml/2006/chart" xmlns:dgm="http://schemas.openxmlformats.org/drawingml/2006/diagram" xmlns:o="urn:schemas-microsoft-com:office:office" xmlns:v="urn:schemas-microsoft-com:vml" xmlns:pvml="urn:schemas-microsoft-com:office:powerpoint" xmlns:com="http://schemas.openxmlformats.org/drawingml/2006/compatibility" xmlns:p14="http://schemas.microsoft.com/office/powerpoint/2010/main">
+  <p:cSld>
+    <p:spTree>
+      <p:nvGrpSpPr>
+        <p:cNvPr id="110" name="Shape 110"/>
+        <p:cNvGrpSpPr/>
+        <p:nvPr/>
+      </p:nvGrpSpPr>
+      <p:grpSpPr>
+        <a:xfrm>
+          <a:off y="0" x="0"/>
+          <a:ext cy="0" cx="0"/>
+          <a:chOff y="0" x="0"/>
+          <a:chExt cy="0" cx="0"/>
+        </a:xfrm>
+      </p:grpSpPr>
+      <p:pic>
+        <p:nvPicPr>
+          <p:cNvPr id="111" name="Shape 111"/>
           <p:cNvPicPr preferRelativeResize="0"/>
           <p:nvPr/>
         </p:nvPicPr>
@@ -7658,12 +8212,12 @@
 </p:sld>
 </file>
 
-<file path=ppt/slides/slide15.xml><?xml version="1.0" encoding="utf-8"?>
+<file path=ppt/slides/slide17.xml><?xml version="1.0" encoding="utf-8"?>
 <p:sld xmlns:a="http://schemas.openxmlformats.org/drawingml/2006/main" xmlns:r="http://schemas.openxmlformats.org/officeDocument/2006/relationships" xmlns:mc="http://schemas.openxmlformats.org/markup-compatibility/2006" xmlns:mv="urn:schemas-microsoft-com:mac:vml" xmlns:p="http://schemas.openxmlformats.org/presentationml/2006/main" xmlns:c="http://schemas.openxmlformats.org/drawingml/2006/chart" xmlns:dgm="http://schemas.openxmlformats.org/drawingml/2006/diagram" xmlns:o="urn:schemas-microsoft-com:office:office" xmlns:v="urn:schemas-microsoft-com:vml" xmlns:pvml="urn:schemas-microsoft-com:office:powerpoint" xmlns:com="http://schemas.openxmlformats.org/drawingml/2006/compatibility" xmlns:p14="http://schemas.microsoft.com/office/powerpoint/2010/main">
   <p:cSld>
     <p:spTree>
       <p:nvGrpSpPr>
-        <p:cNvPr id="103" name="Shape 103"/>
+        <p:cNvPr id="115" name="Shape 115"/>
         <p:cNvGrpSpPr/>
         <p:nvPr/>
       </p:nvGrpSpPr>
@@ -7677,7 +8231,7 @@
       </p:grpSpPr>
       <p:pic>
         <p:nvPicPr>
-          <p:cNvPr id="104" name="Shape 104"/>
+          <p:cNvPr id="116" name="Shape 116"/>
           <p:cNvPicPr preferRelativeResize="0"/>
           <p:nvPr/>
         </p:nvPicPr>
@@ -7708,12 +8262,12 @@
 </p:sld>
 </file>
 
-<file path=ppt/slides/slide16.xml><?xml version="1.0" encoding="utf-8"?>
+<file path=ppt/slides/slide18.xml><?xml version="1.0" encoding="utf-8"?>
 <p:sld xmlns:a="http://schemas.openxmlformats.org/drawingml/2006/main" xmlns:r="http://schemas.openxmlformats.org/officeDocument/2006/relationships" xmlns:mc="http://schemas.openxmlformats.org/markup-compatibility/2006" xmlns:mv="urn:schemas-microsoft-com:mac:vml" xmlns:p="http://schemas.openxmlformats.org/presentationml/2006/main" xmlns:c="http://schemas.openxmlformats.org/drawingml/2006/chart" xmlns:dgm="http://schemas.openxmlformats.org/drawingml/2006/diagram" xmlns:o="urn:schemas-microsoft-com:office:office" xmlns:v="urn:schemas-microsoft-com:vml" xmlns:pvml="urn:schemas-microsoft-com:office:powerpoint" xmlns:com="http://schemas.openxmlformats.org/drawingml/2006/compatibility" xmlns:p14="http://schemas.microsoft.com/office/powerpoint/2010/main">
   <p:cSld>
     <p:spTree>
       <p:nvGrpSpPr>
-        <p:cNvPr id="108" name="Shape 108"/>
+        <p:cNvPr id="120" name="Shape 120"/>
         <p:cNvGrpSpPr/>
         <p:nvPr/>
       </p:nvGrpSpPr>
@@ -7727,7 +8281,7 @@
       </p:grpSpPr>
       <p:sp>
         <p:nvSpPr>
-          <p:cNvPr id="109" name="Shape 109"/>
+          <p:cNvPr id="121" name="Shape 121"/>
           <p:cNvSpPr txBox="1"/>
           <p:nvPr>
             <p:ph idx="1" type="body"/>
@@ -7835,7 +8389,7 @@
       </p:sp>
       <p:sp>
         <p:nvSpPr>
-          <p:cNvPr id="110" name="Shape 110"/>
+          <p:cNvPr id="122" name="Shape 122"/>
           <p:cNvSpPr txBox="1"/>
           <p:nvPr>
             <p:ph type="title"/>
@@ -7877,12 +8431,12 @@
 </p:sld>
 </file>
 
-<file path=ppt/slides/slide17.xml><?xml version="1.0" encoding="utf-8"?>
+<file path=ppt/slides/slide19.xml><?xml version="1.0" encoding="utf-8"?>
 <p:sld xmlns:a="http://schemas.openxmlformats.org/drawingml/2006/main" xmlns:r="http://schemas.openxmlformats.org/officeDocument/2006/relationships" xmlns:mc="http://schemas.openxmlformats.org/markup-compatibility/2006" xmlns:mv="urn:schemas-microsoft-com:mac:vml" xmlns:p="http://schemas.openxmlformats.org/presentationml/2006/main" xmlns:c="http://schemas.openxmlformats.org/drawingml/2006/chart" xmlns:dgm="http://schemas.openxmlformats.org/drawingml/2006/diagram" xmlns:o="urn:schemas-microsoft-com:office:office" xmlns:v="urn:schemas-microsoft-com:vml" xmlns:pvml="urn:schemas-microsoft-com:office:powerpoint" xmlns:com="http://schemas.openxmlformats.org/drawingml/2006/compatibility" xmlns:p14="http://schemas.microsoft.com/office/powerpoint/2010/main">
   <p:cSld>
     <p:spTree>
       <p:nvGrpSpPr>
-        <p:cNvPr id="114" name="Shape 114"/>
+        <p:cNvPr id="126" name="Shape 126"/>
         <p:cNvGrpSpPr/>
         <p:nvPr/>
       </p:nvGrpSpPr>
@@ -7896,16 +8450,14 @@
       </p:grpSpPr>
       <p:sp>
         <p:nvSpPr>
-          <p:cNvPr id="115" name="Shape 115"/>
+          <p:cNvPr id="127" name="Shape 127"/>
           <p:cNvSpPr txBox="1"/>
-          <p:nvPr>
-            <p:ph idx="1" type="body"/>
-          </p:nvPr>
+          <p:nvPr/>
         </p:nvSpPr>
         <p:spPr>
           <a:xfrm>
-            <a:off y="1200150" x="457200"/>
-            <a:ext cy="3725699" cx="8229600"/>
+            <a:off y="2144100" x="2275950"/>
+            <a:ext cy="855300" cx="4592099"/>
           </a:xfrm>
           <a:prstGeom prst="rect">
             <a:avLst/>
@@ -7917,45 +8469,16 @@
           </a:bodyPr>
           <a:lstStyle/>
           <a:p>
-            <a:pPr>
+            <a:pPr algn="ctr">
               <a:buNone/>
             </a:pPr>
             <a:r>
-              <a:rPr lang="en"/>
-              <a:t>Some notes from our retrospective</a:t>
-            </a:r>
-          </a:p>
-        </p:txBody>
-      </p:sp>
-      <p:sp>
-        <p:nvSpPr>
-          <p:cNvPr id="116" name="Shape 116"/>
-          <p:cNvSpPr txBox="1"/>
-          <p:nvPr>
-            <p:ph type="title"/>
-          </p:nvPr>
-        </p:nvSpPr>
-        <p:spPr>
-          <a:xfrm>
-            <a:off y="205978" x="457200"/>
-            <a:ext cy="857400" cx="8229600"/>
-          </a:xfrm>
-          <a:prstGeom prst="rect">
-            <a:avLst/>
-          </a:prstGeom>
-        </p:spPr>
-        <p:txBody>
-          <a:bodyPr bIns="91425" rIns="91425" lIns="91425" tIns="91425" anchor="b" anchorCtr="0">
-            <a:noAutofit/>
-          </a:bodyPr>
-          <a:lstStyle/>
-          <a:p>
-            <a:pPr>
-              <a:buNone/>
-            </a:pPr>
-            <a:r>
-              <a:rPr lang="en"/>
-              <a:t>Retrospective</a:t>
+              <a:rPr b="1" sz="3600" lang="en">
+                <a:solidFill>
+                  <a:srgbClr val="FFFFFF"/>
+                </a:solidFill>
+              </a:rPr>
+              <a:t>Demonstration</a:t>
             </a:r>
           </a:p>
         </p:txBody>
@@ -8023,6 +8546,145 @@
                 <a:sym typeface="Trebuchet MS"/>
               </a:rPr>
               <a:t>Team Introductions</a:t>
+            </a:r>
+          </a:p>
+        </p:txBody>
+      </p:sp>
+    </p:spTree>
+  </p:cSld>
+  <p:clrMapOvr>
+    <a:masterClrMapping/>
+  </p:clrMapOvr>
+  <p:transition spd="slow">
+    <p:cut/>
+  </p:transition>
+</p:sld>
+</file>
+
+<file path=ppt/slides/slide20.xml><?xml version="1.0" encoding="utf-8"?>
+<p:sld xmlns:a="http://schemas.openxmlformats.org/drawingml/2006/main" xmlns:r="http://schemas.openxmlformats.org/officeDocument/2006/relationships" xmlns:mc="http://schemas.openxmlformats.org/markup-compatibility/2006" xmlns:mv="urn:schemas-microsoft-com:mac:vml" xmlns:p="http://schemas.openxmlformats.org/presentationml/2006/main" xmlns:c="http://schemas.openxmlformats.org/drawingml/2006/chart" xmlns:dgm="http://schemas.openxmlformats.org/drawingml/2006/diagram" xmlns:o="urn:schemas-microsoft-com:office:office" xmlns:v="urn:schemas-microsoft-com:vml" xmlns:pvml="urn:schemas-microsoft-com:office:powerpoint" xmlns:com="http://schemas.openxmlformats.org/drawingml/2006/compatibility" xmlns:p14="http://schemas.microsoft.com/office/powerpoint/2010/main">
+  <p:cSld>
+    <p:spTree>
+      <p:nvGrpSpPr>
+        <p:cNvPr id="131" name="Shape 131"/>
+        <p:cNvGrpSpPr/>
+        <p:nvPr/>
+      </p:nvGrpSpPr>
+      <p:grpSpPr>
+        <a:xfrm>
+          <a:off y="0" x="0"/>
+          <a:ext cy="0" cx="0"/>
+          <a:chOff y="0" x="0"/>
+          <a:chExt cy="0" cx="0"/>
+        </a:xfrm>
+      </p:grpSpPr>
+      <p:sp>
+        <p:nvSpPr>
+          <p:cNvPr id="132" name="Shape 132"/>
+          <p:cNvSpPr txBox="1"/>
+          <p:nvPr/>
+        </p:nvSpPr>
+        <p:spPr>
+          <a:xfrm>
+            <a:off y="1933050" x="2275950"/>
+            <a:ext cy="1277399" cx="4592099"/>
+          </a:xfrm>
+          <a:prstGeom prst="rect">
+            <a:avLst/>
+          </a:prstGeom>
+        </p:spPr>
+        <p:txBody>
+          <a:bodyPr bIns="91425" rIns="91425" lIns="91425" tIns="91425" anchor="t" anchorCtr="0">
+            <a:noAutofit/>
+          </a:bodyPr>
+          <a:lstStyle/>
+          <a:p>
+            <a:pPr algn="ctr" rtl="0" lvl="0">
+              <a:buNone/>
+            </a:pPr>
+            <a:r>
+              <a:rPr b="1" sz="3600" lang="en">
+                <a:solidFill>
+                  <a:srgbClr val="FFFFFF"/>
+                </a:solidFill>
+              </a:rPr>
+              <a:t>Feedback?</a:t>
+            </a:r>
+          </a:p>
+          <a:p>
+            <a:pPr algn="ctr" rtl="0" lvl="0">
+              <a:buNone/>
+            </a:pPr>
+            <a:r>
+              <a:rPr b="1" sz="3600" lang="en">
+                <a:solidFill>
+                  <a:srgbClr val="FFFFFF"/>
+                </a:solidFill>
+              </a:rPr>
+              <a:t>Q&amp;A</a:t>
+            </a:r>
+          </a:p>
+        </p:txBody>
+      </p:sp>
+    </p:spTree>
+  </p:cSld>
+  <p:clrMapOvr>
+    <a:masterClrMapping/>
+  </p:clrMapOvr>
+  <p:transition spd="slow">
+    <p:cut/>
+  </p:transition>
+</p:sld>
+</file>
+
+<file path=ppt/slides/slide21.xml><?xml version="1.0" encoding="utf-8"?>
+<p:sld xmlns:a="http://schemas.openxmlformats.org/drawingml/2006/main" xmlns:r="http://schemas.openxmlformats.org/officeDocument/2006/relationships" xmlns:mc="http://schemas.openxmlformats.org/markup-compatibility/2006" xmlns:mv="urn:schemas-microsoft-com:mac:vml" xmlns:p="http://schemas.openxmlformats.org/presentationml/2006/main" xmlns:c="http://schemas.openxmlformats.org/drawingml/2006/chart" xmlns:dgm="http://schemas.openxmlformats.org/drawingml/2006/diagram" xmlns:o="urn:schemas-microsoft-com:office:office" xmlns:v="urn:schemas-microsoft-com:vml" xmlns:pvml="urn:schemas-microsoft-com:office:powerpoint" xmlns:com="http://schemas.openxmlformats.org/drawingml/2006/compatibility" xmlns:p14="http://schemas.microsoft.com/office/powerpoint/2010/main">
+  <p:cSld>
+    <p:spTree>
+      <p:nvGrpSpPr>
+        <p:cNvPr id="136" name="Shape 136"/>
+        <p:cNvGrpSpPr/>
+        <p:nvPr/>
+      </p:nvGrpSpPr>
+      <p:grpSpPr>
+        <a:xfrm>
+          <a:off y="0" x="0"/>
+          <a:ext cy="0" cx="0"/>
+          <a:chOff y="0" x="0"/>
+          <a:chExt cy="0" cx="0"/>
+        </a:xfrm>
+      </p:grpSpPr>
+      <p:sp>
+        <p:nvSpPr>
+          <p:cNvPr id="137" name="Shape 137"/>
+          <p:cNvSpPr txBox="1"/>
+          <p:nvPr/>
+        </p:nvSpPr>
+        <p:spPr>
+          <a:xfrm>
+            <a:off y="2170800" x="2275950"/>
+            <a:ext cy="801900" cx="4592099"/>
+          </a:xfrm>
+          <a:prstGeom prst="rect">
+            <a:avLst/>
+          </a:prstGeom>
+        </p:spPr>
+        <p:txBody>
+          <a:bodyPr bIns="91425" rIns="91425" lIns="91425" tIns="91425" anchor="t" anchorCtr="0">
+            <a:noAutofit/>
+          </a:bodyPr>
+          <a:lstStyle/>
+          <a:p>
+            <a:pPr algn="ctr" rtl="0" lvl="0">
+              <a:buNone/>
+            </a:pPr>
+            <a:r>
+              <a:rPr b="1" sz="3600" lang="en">
+                <a:solidFill>
+                  <a:srgbClr val="FFFFFF"/>
+                </a:solidFill>
+              </a:rPr>
+              <a:t>Thank you</a:t>
             </a:r>
           </a:p>
         </p:txBody>
@@ -8229,7 +8891,7 @@
             </a:pPr>
             <a:r>
               <a:rPr lang="en"/>
-              <a:t>brainstormed and built a list of high level use cases</a:t>
+              <a:t>brainstormed and built a list of 38 high level use cases</a:t>
             </a:r>
           </a:p>
         </p:txBody>
@@ -8310,7 +8972,7 @@
             <a:tbl>
               <a:tblPr>
                 <a:noFill/>
-                <a:tableStyleId>{CD033331-878A-42F1-A552-CE589D01032B}</a:tableStyleId>
+                <a:tableStyleId>{32F8E58F-9A1E-4351-A753-8223528855B2}</a:tableStyleId>
               </a:tblPr>
               <a:tblGrid>
                 <a:gridCol w="866775"/>
@@ -11139,7 +11801,7 @@
             <a:tbl>
               <a:tblPr>
                 <a:noFill/>
-                <a:tableStyleId>{51B42767-5E6C-421C-B353-38A84FD6EC2D}</a:tableStyleId>
+                <a:tableStyleId>{DD81E001-2FF7-4640-82E8-83CCEC03D49B}</a:tableStyleId>
               </a:tblPr>
               <a:tblGrid>
                 <a:gridCol w="866775"/>
@@ -13644,7 +14306,7 @@
             <a:tbl>
               <a:tblPr>
                 <a:noFill/>
-                <a:tableStyleId>{B04894AD-3CC7-423F-BAE9-4D85802C7FFD}</a:tableStyleId>
+                <a:tableStyleId>{AEF255B4-483F-4C34-BBE7-D3E1638A18B3}</a:tableStyleId>
               </a:tblPr>
               <a:tblGrid>
                 <a:gridCol w="866775"/>
@@ -16369,7 +17031,7 @@
             <a:tbl>
               <a:tblPr>
                 <a:noFill/>
-                <a:tableStyleId>{64DC9B26-1677-447F-9888-1FC26C66E531}</a:tableStyleId>
+                <a:tableStyleId>{8105A335-2300-40F4-9ECC-65FA9CE4119A}</a:tableStyleId>
               </a:tblPr>
               <a:tblGrid>
                 <a:gridCol w="866775"/>
@@ -18217,7 +18879,7 @@
             </a:pPr>
             <a:r>
               <a:rPr lang="en"/>
-              <a:t>Total budget in hours</a:t>
+              <a:t>Calculated 528 total budgeted hours</a:t>
             </a:r>
           </a:p>
           <a:p>
@@ -18245,7 +18907,21 @@
             </a:pPr>
             <a:r>
               <a:rPr lang="en"/>
-              <a:t>Prioritized list of use cases</a:t>
+              <a:t>Prioritized the list of use cases</a:t>
+            </a:r>
+          </a:p>
+          <a:p>
+            <a:pPr rtl="0" lvl="0" indent="-419100" marL="914400">
+              <a:buClr>
+                <a:schemeClr val="lt1"/>
+              </a:buClr>
+              <a:buSzPct val="166666"/>
+              <a:buFont typeface="Arial"/>
+              <a:buChar char="•"/>
+            </a:pPr>
+            <a:r>
+              <a:rPr lang="en"/>
+              <a:t>Pulled highest priority use cases into first iteration</a:t>
             </a:r>
           </a:p>
           <a:p>
@@ -18259,7 +18935,7 @@
             </a:pPr>
             <a:r>
               <a:rPr lang="en"/>
-              <a:t>Pulled highest priority use cases into first iteration</a:t>
+              <a:t>Decided on tools to use</a:t>
             </a:r>
           </a:p>
         </p:txBody>

</xml_diff>

<commit_message>
the pptx had a messed up slide. I recreated to see if it fixed it.
</commit_message>
<xml_diff>
--- a/project-management/Presentations/Chinese Checkers - Iteration #1.pptx
+++ b/project-management/Presentations/Chinese Checkers - Iteration #1.pptx
@@ -3799,7 +3799,7 @@
             <a:tbl>
               <a:tblPr>
                 <a:noFill/>
-                <a:tableStyleId>{33C6B6F2-3FEF-4E1E-8643-E126265D6C57}</a:tableStyleId>
+                <a:tableStyleId>{92D3383A-127F-4EDB-955B-59792D97D2A4}</a:tableStyleId>
               </a:tblPr>
               <a:tblGrid>
                 <a:gridCol w="1438275"/>
@@ -8284,13 +8284,46 @@
           <p:cNvPr id="121" name="Shape 121"/>
           <p:cNvSpPr txBox="1"/>
           <p:nvPr>
+            <p:ph type="title"/>
+          </p:nvPr>
+        </p:nvSpPr>
+        <p:spPr>
+          <a:xfrm>
+            <a:off y="205978" x="457200"/>
+            <a:ext cy="857400" cx="8229600"/>
+          </a:xfrm>
+          <a:prstGeom prst="rect">
+            <a:avLst/>
+          </a:prstGeom>
+        </p:spPr>
+        <p:txBody>
+          <a:bodyPr bIns="91425" rIns="91425" lIns="91425" tIns="91425" anchor="b" anchorCtr="0">
+            <a:noAutofit/>
+          </a:bodyPr>
+          <a:lstStyle/>
+          <a:p>
+            <a:pPr>
+              <a:buNone/>
+            </a:pPr>
+            <a:r>
+              <a:rPr lang="en"/>
+              <a:t>Construction</a:t>
+            </a:r>
+          </a:p>
+        </p:txBody>
+      </p:sp>
+      <p:sp>
+        <p:nvSpPr>
+          <p:cNvPr id="122" name="Shape 122"/>
+          <p:cNvSpPr txBox="1"/>
+          <p:nvPr>
             <p:ph idx="1" type="body"/>
           </p:nvPr>
         </p:nvSpPr>
         <p:spPr>
           <a:xfrm>
-            <a:off y="1244242" x="457200"/>
-            <a:ext cy="3630300" cx="8229600"/>
+            <a:off y="1200150" x="457200"/>
+            <a:ext cy="3725699" cx="8229600"/>
           </a:xfrm>
           <a:prstGeom prst="rect">
             <a:avLst/>
@@ -8302,7 +8335,7 @@
           </a:bodyPr>
           <a:lstStyle/>
           <a:p>
-            <a:pPr rtl="0" lvl="0" indent="-419100" marL="914400">
+            <a:pPr rtl="0" lvl="0" indent="-419100" marL="457200">
               <a:buClr>
                 <a:schemeClr val="lt1"/>
               </a:buClr>
@@ -8312,11 +8345,11 @@
             </a:pPr>
             <a:r>
               <a:rPr lang="en"/>
-              <a:t>code and unit test</a:t>
+              <a:t>Code and unit test</a:t>
             </a:r>
           </a:p>
           <a:p>
-            <a:pPr rtl="0" lvl="0" indent="-419100" marL="914400">
+            <a:pPr rtl="0" lvl="0" indent="-419100" marL="457200">
               <a:buClr>
                 <a:schemeClr val="lt1"/>
               </a:buClr>
@@ -8326,11 +8359,11 @@
             </a:pPr>
             <a:r>
               <a:rPr lang="en"/>
-              <a:t>integration test</a:t>
+              <a:t>Integration test</a:t>
             </a:r>
           </a:p>
           <a:p>
-            <a:pPr rtl="0" lvl="0" indent="-419100" marL="914400">
+            <a:pPr rtl="0" lvl="0" indent="-419100" marL="457200">
               <a:buClr>
                 <a:schemeClr val="lt1"/>
               </a:buClr>
@@ -8340,11 +8373,11 @@
             </a:pPr>
             <a:r>
               <a:rPr lang="en"/>
-              <a:t>performance test</a:t>
+              <a:t>Performance test</a:t>
             </a:r>
           </a:p>
           <a:p>
-            <a:pPr rtl="0" lvl="0" indent="-419100" marL="914400">
+            <a:pPr rtl="0" lvl="0" indent="-419100" marL="457200">
               <a:buClr>
                 <a:schemeClr val="lt1"/>
               </a:buClr>
@@ -8354,11 +8387,11 @@
             </a:pPr>
             <a:r>
               <a:rPr lang="en"/>
-              <a:t>stress test</a:t>
+              <a:t>Stress test</a:t>
             </a:r>
           </a:p>
           <a:p>
-            <a:pPr rtl="0" lvl="0" indent="-419100" marL="914400">
+            <a:pPr rtl="0" lvl="0" indent="-419100" marL="457200">
               <a:buClr>
                 <a:schemeClr val="lt1"/>
               </a:buClr>
@@ -8368,11 +8401,11 @@
             </a:pPr>
             <a:r>
               <a:rPr lang="en"/>
-              <a:t>usability test</a:t>
+              <a:t>Usability test</a:t>
             </a:r>
           </a:p>
           <a:p>
-            <a:pPr lvl="0" indent="-419100" marL="914400">
+            <a:pPr lvl="0" indent="-419100" marL="457200">
               <a:buClr>
                 <a:schemeClr val="lt1"/>
               </a:buClr>
@@ -8382,40 +8415,7 @@
             </a:pPr>
             <a:r>
               <a:rPr lang="en"/>
-              <a:t>acceptance test</a:t>
-            </a:r>
-          </a:p>
-        </p:txBody>
-      </p:sp>
-      <p:sp>
-        <p:nvSpPr>
-          <p:cNvPr id="122" name="Shape 122"/>
-          <p:cNvSpPr txBox="1"/>
-          <p:nvPr>
-            <p:ph type="title"/>
-          </p:nvPr>
-        </p:nvSpPr>
-        <p:spPr>
-          <a:xfrm>
-            <a:off y="205978" x="457200"/>
-            <a:ext cy="994200" cx="8229600"/>
-          </a:xfrm>
-          <a:prstGeom prst="rect">
-            <a:avLst/>
-          </a:prstGeom>
-        </p:spPr>
-        <p:txBody>
-          <a:bodyPr bIns="91425" rIns="91425" lIns="91425" tIns="91425" anchor="b" anchorCtr="0">
-            <a:noAutofit/>
-          </a:bodyPr>
-          <a:lstStyle/>
-          <a:p>
-            <a:pPr indent="0" marL="457200">
-              <a:buNone/>
-            </a:pPr>
-            <a:r>
-              <a:rPr lang="en"/>
-              <a:t>Construction</a:t>
+              <a:t>Acceptance test</a:t>
             </a:r>
           </a:p>
         </p:txBody>
@@ -8972,7 +8972,7 @@
             <a:tbl>
               <a:tblPr>
                 <a:noFill/>
-                <a:tableStyleId>{32F8E58F-9A1E-4351-A753-8223528855B2}</a:tableStyleId>
+                <a:tableStyleId>{843A24E1-F98B-4BEE-8535-BBDA1EEABBD5}</a:tableStyleId>
               </a:tblPr>
               <a:tblGrid>
                 <a:gridCol w="866775"/>
@@ -11801,7 +11801,7 @@
             <a:tbl>
               <a:tblPr>
                 <a:noFill/>
-                <a:tableStyleId>{DD81E001-2FF7-4640-82E8-83CCEC03D49B}</a:tableStyleId>
+                <a:tableStyleId>{A35D7774-75A4-4BD6-83BB-0FC8C655A755}</a:tableStyleId>
               </a:tblPr>
               <a:tblGrid>
                 <a:gridCol w="866775"/>
@@ -14306,7 +14306,7 @@
             <a:tbl>
               <a:tblPr>
                 <a:noFill/>
-                <a:tableStyleId>{AEF255B4-483F-4C34-BBE7-D3E1638A18B3}</a:tableStyleId>
+                <a:tableStyleId>{82D9124A-F5E1-4871-B7CF-1DF65E5CDEEE}</a:tableStyleId>
               </a:tblPr>
               <a:tblGrid>
                 <a:gridCol w="866775"/>
@@ -17031,7 +17031,7 @@
             <a:tbl>
               <a:tblPr>
                 <a:noFill/>
-                <a:tableStyleId>{8105A335-2300-40F4-9ECC-65FA9CE4119A}</a:tableStyleId>
+                <a:tableStyleId>{54EC6C80-73DC-459F-9C51-C91D76CFC87E}</a:tableStyleId>
               </a:tblPr>
               <a:tblGrid>
                 <a:gridCol w="866775"/>
@@ -19262,283 +19262,6 @@
 </file>
 
 <file path=ppt/theme/theme2.xml><?xml version="1.0" encoding="utf-8"?>
-<a:theme xmlns:a="http://schemas.openxmlformats.org/drawingml/2006/main" xmlns:r="http://schemas.openxmlformats.org/officeDocument/2006/relationships" name="Custom Theme">
-  <a:themeElements>
-    <a:clrScheme name="Default">
-      <a:dk1>
-        <a:srgbClr val="000000"/>
-      </a:dk1>
-      <a:lt1>
-        <a:srgbClr val="FFFFFF"/>
-      </a:lt1>
-      <a:dk2>
-        <a:srgbClr val="158158"/>
-      </a:dk2>
-      <a:lt2>
-        <a:srgbClr val="F3F3F3"/>
-      </a:lt2>
-      <a:accent1>
-        <a:srgbClr val="058DC7"/>
-      </a:accent1>
-      <a:accent2>
-        <a:srgbClr val="50B432"/>
-      </a:accent2>
-      <a:accent3>
-        <a:srgbClr val="ED561B"/>
-      </a:accent3>
-      <a:accent4>
-        <a:srgbClr val="EDEF00"/>
-      </a:accent4>
-      <a:accent5>
-        <a:srgbClr val="24CBE5"/>
-      </a:accent5>
-      <a:accent6>
-        <a:srgbClr val="64E572"/>
-      </a:accent6>
-      <a:hlink>
-        <a:srgbClr val="2200CC"/>
-      </a:hlink>
-      <a:folHlink>
-        <a:srgbClr val="551A8B"/>
-      </a:folHlink>
-    </a:clrScheme>
-    <a:fontScheme name="Office">
-      <a:majorFont>
-        <a:latin typeface="Arial"/>
-        <a:ea typeface=""/>
-        <a:cs typeface=""/>
-        <a:font typeface="ＭＳ Ｐゴシック" script="Jpan"/>
-        <a:font typeface="맑은 고딕" script="Hang"/>
-        <a:font typeface="宋体" script="Hans"/>
-        <a:font typeface="新細明體" script="Hant"/>
-        <a:font typeface="Times New Roman" script="Arab"/>
-        <a:font typeface="Times New Roman" script="Hebr"/>
-        <a:font typeface="Angsana New" script="Thai"/>
-        <a:font typeface="Nyala" script="Ethi"/>
-        <a:font typeface="Vrinda" script="Beng"/>
-        <a:font typeface="Shruti" script="Gujr"/>
-        <a:font typeface="MoolBoran" script="Khmr"/>
-        <a:font typeface="Tunga" script="Knda"/>
-        <a:font typeface="Raavi" script="Guru"/>
-        <a:font typeface="Euphemia" script="Cans"/>
-        <a:font typeface="Plantagenet Cherokee" script="Cher"/>
-        <a:font typeface="Microsoft Yi Baiti" script="Yiii"/>
-        <a:font typeface="Microsoft Himalaya" script="Tibt"/>
-        <a:font typeface="MV Boli" script="Thaa"/>
-        <a:font typeface="Mangal" script="Deva"/>
-        <a:font typeface="Gautami" script="Telu"/>
-        <a:font typeface="Latha" script="Taml"/>
-        <a:font typeface="Estrangelo Edessa" script="Syrc"/>
-        <a:font typeface="Kalinga" script="Orya"/>
-        <a:font typeface="Kartika" script="Mlym"/>
-        <a:font typeface="DokChampa" script="Laoo"/>
-        <a:font typeface="Iskoola Pota" script="Sinh"/>
-        <a:font typeface="Mongolian Baiti" script="Mong"/>
-        <a:font typeface="Times New Roman" script="Viet"/>
-        <a:font typeface="Microsoft Uighur" script="Uigh"/>
-      </a:majorFont>
-      <a:minorFont>
-        <a:latin typeface="Arial"/>
-        <a:ea typeface=""/>
-        <a:cs typeface=""/>
-        <a:font typeface="ＭＳ Ｐゴシック" script="Jpan"/>
-        <a:font typeface="맑은 고딕" script="Hang"/>
-        <a:font typeface="宋体" script="Hans"/>
-        <a:font typeface="新細明體" script="Hant"/>
-        <a:font typeface="Arial" script="Arab"/>
-        <a:font typeface="Arial" script="Hebr"/>
-        <a:font typeface="Cordia New" script="Thai"/>
-        <a:font typeface="Nyala" script="Ethi"/>
-        <a:font typeface="Vrinda" script="Beng"/>
-        <a:font typeface="Shruti" script="Gujr"/>
-        <a:font typeface="DaunPenh" script="Khmr"/>
-        <a:font typeface="Tunga" script="Knda"/>
-        <a:font typeface="Raavi" script="Guru"/>
-        <a:font typeface="Euphemia" script="Cans"/>
-        <a:font typeface="Plantagenet Cherokee" script="Cher"/>
-        <a:font typeface="Microsoft Yi Baiti" script="Yiii"/>
-        <a:font typeface="Microsoft Himalaya" script="Tibt"/>
-        <a:font typeface="MV Boli" script="Thaa"/>
-        <a:font typeface="Mangal" script="Deva"/>
-        <a:font typeface="Gautami" script="Telu"/>
-        <a:font typeface="Latha" script="Taml"/>
-        <a:font typeface="Estrangelo Edessa" script="Syrc"/>
-        <a:font typeface="Kalinga" script="Orya"/>
-        <a:font typeface="Kartika" script="Mlym"/>
-        <a:font typeface="DokChampa" script="Laoo"/>
-        <a:font typeface="Iskoola Pota" script="Sinh"/>
-        <a:font typeface="Mongolian Baiti" script="Mong"/>
-        <a:font typeface="Arial" script="Viet"/>
-        <a:font typeface="Microsoft Uighur" script="Uigh"/>
-      </a:minorFont>
-    </a:fontScheme>
-    <a:fmtScheme name="Office">
-      <a:fillStyleLst>
-        <a:solidFill>
-          <a:schemeClr val="phClr"/>
-        </a:solidFill>
-        <a:gradFill rotWithShape="1">
-          <a:gsLst>
-            <a:gs pos="0">
-              <a:schemeClr val="phClr">
-                <a:tint val="50000"/>
-                <a:satMod val="300000"/>
-              </a:schemeClr>
-            </a:gs>
-            <a:gs pos="35000">
-              <a:schemeClr val="phClr">
-                <a:tint val="37000"/>
-                <a:satMod val="300000"/>
-              </a:schemeClr>
-            </a:gs>
-            <a:gs pos="100000">
-              <a:schemeClr val="phClr">
-                <a:tint val="15000"/>
-                <a:satMod val="350000"/>
-              </a:schemeClr>
-            </a:gs>
-          </a:gsLst>
-          <a:lin ang="16200000" scaled="1"/>
-        </a:gradFill>
-        <a:gradFill rotWithShape="1">
-          <a:gsLst>
-            <a:gs pos="0">
-              <a:schemeClr val="phClr">
-                <a:tint val="100000"/>
-                <a:shade val="100000"/>
-                <a:satMod val="130000"/>
-              </a:schemeClr>
-            </a:gs>
-            <a:gs pos="100000">
-              <a:schemeClr val="phClr">
-                <a:tint val="50000"/>
-                <a:shade val="100000"/>
-                <a:satMod val="350000"/>
-              </a:schemeClr>
-            </a:gs>
-          </a:gsLst>
-          <a:lin ang="16200000" scaled="0"/>
-        </a:gradFill>
-      </a:fillStyleLst>
-      <a:lnStyleLst>
-        <a:ln w="9525" algn="ctr" cap="flat" cmpd="sng">
-          <a:solidFill>
-            <a:schemeClr val="phClr">
-              <a:shade val="95000"/>
-              <a:satMod val="105000"/>
-            </a:schemeClr>
-          </a:solidFill>
-          <a:prstDash val="solid"/>
-        </a:ln>
-        <a:ln w="25400" algn="ctr" cap="flat" cmpd="sng">
-          <a:solidFill>
-            <a:schemeClr val="phClr"/>
-          </a:solidFill>
-          <a:prstDash val="solid"/>
-        </a:ln>
-        <a:ln w="38100" algn="ctr" cap="flat" cmpd="sng">
-          <a:solidFill>
-            <a:schemeClr val="phClr"/>
-          </a:solidFill>
-          <a:prstDash val="solid"/>
-        </a:ln>
-      </a:lnStyleLst>
-      <a:effectStyleLst>
-        <a:effectStyle>
-          <a:effectLst>
-            <a:outerShdw rotWithShape="0" dir="5400000" blurRad="40000" dist="20000">
-              <a:srgbClr val="000000">
-                <a:alpha val="38000"/>
-              </a:srgbClr>
-            </a:outerShdw>
-          </a:effectLst>
-        </a:effectStyle>
-        <a:effectStyle>
-          <a:effectLst>
-            <a:outerShdw rotWithShape="0" dir="5400000" blurRad="40000" dist="23000">
-              <a:srgbClr val="000000">
-                <a:alpha val="35000"/>
-              </a:srgbClr>
-            </a:outerShdw>
-          </a:effectLst>
-        </a:effectStyle>
-        <a:effectStyle>
-          <a:effectLst>
-            <a:outerShdw rotWithShape="0" dir="5400000" blurRad="40000" dist="23000">
-              <a:srgbClr val="000000">
-                <a:alpha val="35000"/>
-              </a:srgbClr>
-            </a:outerShdw>
-          </a:effectLst>
-          <a:scene3d>
-            <a:camera prst="orthographicFront">
-              <a:rot rev="0" lon="0" lat="0"/>
-            </a:camera>
-            <a:lightRig dir="t" rig="threePt">
-              <a:rot rev="1200000" lon="0" lat="0"/>
-            </a:lightRig>
-          </a:scene3d>
-          <a:sp3d>
-            <a:bevelT w="63500" h="25400"/>
-          </a:sp3d>
-        </a:effectStyle>
-      </a:effectStyleLst>
-      <a:bgFillStyleLst>
-        <a:solidFill>
-          <a:schemeClr val="phClr"/>
-        </a:solidFill>
-        <a:gradFill rotWithShape="1">
-          <a:gsLst>
-            <a:gs pos="0">
-              <a:schemeClr val="phClr">
-                <a:tint val="40000"/>
-                <a:satMod val="350000"/>
-              </a:schemeClr>
-            </a:gs>
-            <a:gs pos="40000">
-              <a:schemeClr val="phClr">
-                <a:tint val="45000"/>
-                <a:shade val="99000"/>
-                <a:satMod val="350000"/>
-              </a:schemeClr>
-            </a:gs>
-            <a:gs pos="100000">
-              <a:schemeClr val="phClr">
-                <a:shade val="20000"/>
-                <a:satMod val="255000"/>
-              </a:schemeClr>
-            </a:gs>
-          </a:gsLst>
-          <a:path path="circle">
-            <a:fillToRect t="-80000" b="180000" r="50000" l="50000"/>
-          </a:path>
-        </a:gradFill>
-        <a:gradFill rotWithShape="1">
-          <a:gsLst>
-            <a:gs pos="0">
-              <a:schemeClr val="phClr">
-                <a:tint val="80000"/>
-                <a:satMod val="300000"/>
-              </a:schemeClr>
-            </a:gs>
-            <a:gs pos="100000">
-              <a:schemeClr val="phClr">
-                <a:shade val="30000"/>
-                <a:satMod val="200000"/>
-              </a:schemeClr>
-            </a:gs>
-          </a:gsLst>
-          <a:path path="circle">
-            <a:fillToRect t="50000" b="50000" r="50000" l="50000"/>
-          </a:path>
-        </a:gradFill>
-      </a:bgFillStyleLst>
-    </a:fmtScheme>
-  </a:themeElements>
-</a:theme>
-</file>
-
-<file path=ppt/theme/theme3.xml><?xml version="1.0" encoding="utf-8"?>
 <a:theme xmlns:a="http://schemas.openxmlformats.org/drawingml/2006/main" xmlns:r="http://schemas.openxmlformats.org/officeDocument/2006/relationships" name="Office Theme">
   <a:themeElements>
     <a:clrScheme name="Office">
@@ -19854,4 +19577,281 @@
   </a:objectDefaults>
   <a:extraClrSchemeLst/>
 </a:theme>
+</file>
+
+<file path=ppt/theme/theme3.xml><?xml version="1.0" encoding="utf-8"?>
+<a:theme xmlns:a="http://schemas.openxmlformats.org/drawingml/2006/main" xmlns:r="http://schemas.openxmlformats.org/officeDocument/2006/relationships" name="Custom Theme">
+  <a:themeElements>
+    <a:clrScheme name="Default">
+      <a:dk1>
+        <a:srgbClr val="000000"/>
+      </a:dk1>
+      <a:lt1>
+        <a:srgbClr val="FFFFFF"/>
+      </a:lt1>
+      <a:dk2>
+        <a:srgbClr val="158158"/>
+      </a:dk2>
+      <a:lt2>
+        <a:srgbClr val="F3F3F3"/>
+      </a:lt2>
+      <a:accent1>
+        <a:srgbClr val="058DC7"/>
+      </a:accent1>
+      <a:accent2>
+        <a:srgbClr val="50B432"/>
+      </a:accent2>
+      <a:accent3>
+        <a:srgbClr val="ED561B"/>
+      </a:accent3>
+      <a:accent4>
+        <a:srgbClr val="EDEF00"/>
+      </a:accent4>
+      <a:accent5>
+        <a:srgbClr val="24CBE5"/>
+      </a:accent5>
+      <a:accent6>
+        <a:srgbClr val="64E572"/>
+      </a:accent6>
+      <a:hlink>
+        <a:srgbClr val="2200CC"/>
+      </a:hlink>
+      <a:folHlink>
+        <a:srgbClr val="551A8B"/>
+      </a:folHlink>
+    </a:clrScheme>
+    <a:fontScheme name="Office">
+      <a:majorFont>
+        <a:latin typeface="Arial"/>
+        <a:ea typeface=""/>
+        <a:cs typeface=""/>
+        <a:font typeface="ＭＳ Ｐゴシック" script="Jpan"/>
+        <a:font typeface="맑은 고딕" script="Hang"/>
+        <a:font typeface="宋体" script="Hans"/>
+        <a:font typeface="新細明體" script="Hant"/>
+        <a:font typeface="Times New Roman" script="Arab"/>
+        <a:font typeface="Times New Roman" script="Hebr"/>
+        <a:font typeface="Angsana New" script="Thai"/>
+        <a:font typeface="Nyala" script="Ethi"/>
+        <a:font typeface="Vrinda" script="Beng"/>
+        <a:font typeface="Shruti" script="Gujr"/>
+        <a:font typeface="MoolBoran" script="Khmr"/>
+        <a:font typeface="Tunga" script="Knda"/>
+        <a:font typeface="Raavi" script="Guru"/>
+        <a:font typeface="Euphemia" script="Cans"/>
+        <a:font typeface="Plantagenet Cherokee" script="Cher"/>
+        <a:font typeface="Microsoft Yi Baiti" script="Yiii"/>
+        <a:font typeface="Microsoft Himalaya" script="Tibt"/>
+        <a:font typeface="MV Boli" script="Thaa"/>
+        <a:font typeface="Mangal" script="Deva"/>
+        <a:font typeface="Gautami" script="Telu"/>
+        <a:font typeface="Latha" script="Taml"/>
+        <a:font typeface="Estrangelo Edessa" script="Syrc"/>
+        <a:font typeface="Kalinga" script="Orya"/>
+        <a:font typeface="Kartika" script="Mlym"/>
+        <a:font typeface="DokChampa" script="Laoo"/>
+        <a:font typeface="Iskoola Pota" script="Sinh"/>
+        <a:font typeface="Mongolian Baiti" script="Mong"/>
+        <a:font typeface="Times New Roman" script="Viet"/>
+        <a:font typeface="Microsoft Uighur" script="Uigh"/>
+      </a:majorFont>
+      <a:minorFont>
+        <a:latin typeface="Arial"/>
+        <a:ea typeface=""/>
+        <a:cs typeface=""/>
+        <a:font typeface="ＭＳ Ｐゴシック" script="Jpan"/>
+        <a:font typeface="맑은 고딕" script="Hang"/>
+        <a:font typeface="宋体" script="Hans"/>
+        <a:font typeface="新細明體" script="Hant"/>
+        <a:font typeface="Arial" script="Arab"/>
+        <a:font typeface="Arial" script="Hebr"/>
+        <a:font typeface="Cordia New" script="Thai"/>
+        <a:font typeface="Nyala" script="Ethi"/>
+        <a:font typeface="Vrinda" script="Beng"/>
+        <a:font typeface="Shruti" script="Gujr"/>
+        <a:font typeface="DaunPenh" script="Khmr"/>
+        <a:font typeface="Tunga" script="Knda"/>
+        <a:font typeface="Raavi" script="Guru"/>
+        <a:font typeface="Euphemia" script="Cans"/>
+        <a:font typeface="Plantagenet Cherokee" script="Cher"/>
+        <a:font typeface="Microsoft Yi Baiti" script="Yiii"/>
+        <a:font typeface="Microsoft Himalaya" script="Tibt"/>
+        <a:font typeface="MV Boli" script="Thaa"/>
+        <a:font typeface="Mangal" script="Deva"/>
+        <a:font typeface="Gautami" script="Telu"/>
+        <a:font typeface="Latha" script="Taml"/>
+        <a:font typeface="Estrangelo Edessa" script="Syrc"/>
+        <a:font typeface="Kalinga" script="Orya"/>
+        <a:font typeface="Kartika" script="Mlym"/>
+        <a:font typeface="DokChampa" script="Laoo"/>
+        <a:font typeface="Iskoola Pota" script="Sinh"/>
+        <a:font typeface="Mongolian Baiti" script="Mong"/>
+        <a:font typeface="Arial" script="Viet"/>
+        <a:font typeface="Microsoft Uighur" script="Uigh"/>
+      </a:minorFont>
+    </a:fontScheme>
+    <a:fmtScheme name="Office">
+      <a:fillStyleLst>
+        <a:solidFill>
+          <a:schemeClr val="phClr"/>
+        </a:solidFill>
+        <a:gradFill rotWithShape="1">
+          <a:gsLst>
+            <a:gs pos="0">
+              <a:schemeClr val="phClr">
+                <a:tint val="50000"/>
+                <a:satMod val="300000"/>
+              </a:schemeClr>
+            </a:gs>
+            <a:gs pos="35000">
+              <a:schemeClr val="phClr">
+                <a:tint val="37000"/>
+                <a:satMod val="300000"/>
+              </a:schemeClr>
+            </a:gs>
+            <a:gs pos="100000">
+              <a:schemeClr val="phClr">
+                <a:tint val="15000"/>
+                <a:satMod val="350000"/>
+              </a:schemeClr>
+            </a:gs>
+          </a:gsLst>
+          <a:lin ang="16200000" scaled="1"/>
+        </a:gradFill>
+        <a:gradFill rotWithShape="1">
+          <a:gsLst>
+            <a:gs pos="0">
+              <a:schemeClr val="phClr">
+                <a:tint val="100000"/>
+                <a:shade val="100000"/>
+                <a:satMod val="130000"/>
+              </a:schemeClr>
+            </a:gs>
+            <a:gs pos="100000">
+              <a:schemeClr val="phClr">
+                <a:tint val="50000"/>
+                <a:shade val="100000"/>
+                <a:satMod val="350000"/>
+              </a:schemeClr>
+            </a:gs>
+          </a:gsLst>
+          <a:lin ang="16200000" scaled="0"/>
+        </a:gradFill>
+      </a:fillStyleLst>
+      <a:lnStyleLst>
+        <a:ln w="9525" algn="ctr" cap="flat" cmpd="sng">
+          <a:solidFill>
+            <a:schemeClr val="phClr">
+              <a:shade val="95000"/>
+              <a:satMod val="105000"/>
+            </a:schemeClr>
+          </a:solidFill>
+          <a:prstDash val="solid"/>
+        </a:ln>
+        <a:ln w="25400" algn="ctr" cap="flat" cmpd="sng">
+          <a:solidFill>
+            <a:schemeClr val="phClr"/>
+          </a:solidFill>
+          <a:prstDash val="solid"/>
+        </a:ln>
+        <a:ln w="38100" algn="ctr" cap="flat" cmpd="sng">
+          <a:solidFill>
+            <a:schemeClr val="phClr"/>
+          </a:solidFill>
+          <a:prstDash val="solid"/>
+        </a:ln>
+      </a:lnStyleLst>
+      <a:effectStyleLst>
+        <a:effectStyle>
+          <a:effectLst>
+            <a:outerShdw rotWithShape="0" dir="5400000" blurRad="40000" dist="20000">
+              <a:srgbClr val="000000">
+                <a:alpha val="38000"/>
+              </a:srgbClr>
+            </a:outerShdw>
+          </a:effectLst>
+        </a:effectStyle>
+        <a:effectStyle>
+          <a:effectLst>
+            <a:outerShdw rotWithShape="0" dir="5400000" blurRad="40000" dist="23000">
+              <a:srgbClr val="000000">
+                <a:alpha val="35000"/>
+              </a:srgbClr>
+            </a:outerShdw>
+          </a:effectLst>
+        </a:effectStyle>
+        <a:effectStyle>
+          <a:effectLst>
+            <a:outerShdw rotWithShape="0" dir="5400000" blurRad="40000" dist="23000">
+              <a:srgbClr val="000000">
+                <a:alpha val="35000"/>
+              </a:srgbClr>
+            </a:outerShdw>
+          </a:effectLst>
+          <a:scene3d>
+            <a:camera prst="orthographicFront">
+              <a:rot rev="0" lon="0" lat="0"/>
+            </a:camera>
+            <a:lightRig dir="t" rig="threePt">
+              <a:rot rev="1200000" lon="0" lat="0"/>
+            </a:lightRig>
+          </a:scene3d>
+          <a:sp3d>
+            <a:bevelT w="63500" h="25400"/>
+          </a:sp3d>
+        </a:effectStyle>
+      </a:effectStyleLst>
+      <a:bgFillStyleLst>
+        <a:solidFill>
+          <a:schemeClr val="phClr"/>
+        </a:solidFill>
+        <a:gradFill rotWithShape="1">
+          <a:gsLst>
+            <a:gs pos="0">
+              <a:schemeClr val="phClr">
+                <a:tint val="40000"/>
+                <a:satMod val="350000"/>
+              </a:schemeClr>
+            </a:gs>
+            <a:gs pos="40000">
+              <a:schemeClr val="phClr">
+                <a:tint val="45000"/>
+                <a:shade val="99000"/>
+                <a:satMod val="350000"/>
+              </a:schemeClr>
+            </a:gs>
+            <a:gs pos="100000">
+              <a:schemeClr val="phClr">
+                <a:shade val="20000"/>
+                <a:satMod val="255000"/>
+              </a:schemeClr>
+            </a:gs>
+          </a:gsLst>
+          <a:path path="circle">
+            <a:fillToRect t="-80000" b="180000" r="50000" l="50000"/>
+          </a:path>
+        </a:gradFill>
+        <a:gradFill rotWithShape="1">
+          <a:gsLst>
+            <a:gs pos="0">
+              <a:schemeClr val="phClr">
+                <a:tint val="80000"/>
+                <a:satMod val="300000"/>
+              </a:schemeClr>
+            </a:gs>
+            <a:gs pos="100000">
+              <a:schemeClr val="phClr">
+                <a:shade val="30000"/>
+                <a:satMod val="200000"/>
+              </a:schemeClr>
+            </a:gs>
+          </a:gsLst>
+          <a:path path="circle">
+            <a:fillToRect t="50000" b="50000" r="50000" l="50000"/>
+          </a:path>
+        </a:gradFill>
+      </a:bgFillStyleLst>
+    </a:fmtScheme>
+  </a:themeElements>
+</a:theme>
 </file>
</xml_diff>